<commit_message>
add ai study reference
</commit_message>
<xml_diff>
--- a/assets/images/BFS/BFS.pptx
+++ b/assets/images/BFS/BFS.pptx
@@ -6,7 +6,9 @@
   </p:sldMasterIdLst>
   <p:sldIdLst>
     <p:sldId id="256" r:id="rId2"/>
-    <p:sldId id="257" r:id="rId3"/>
+    <p:sldId id="258" r:id="rId3"/>
+    <p:sldId id="259" r:id="rId4"/>
+    <p:sldId id="257" r:id="rId5"/>
   </p:sldIdLst>
   <p:sldSz cx="12192000" cy="6858000"/>
   <p:notesSz cx="6858000" cy="9144000"/>
@@ -116,7 +118,7 @@
 <file path=ppt/revisionInfo.xml><?xml version="1.0" encoding="utf-8"?>
 <p1510:revInfo xmlns:a="http://schemas.openxmlformats.org/drawingml/2006/main" xmlns:r="http://schemas.openxmlformats.org/officeDocument/2006/relationships" xmlns:p1510="http://schemas.microsoft.com/office/powerpoint/2015/10/main">
   <p1510:revLst>
-    <p1510:client id="{3E240DEA-8482-4C40-82B9-6DA1360F8F0C}" v="10" dt="2021-12-15T12:44:53.211"/>
+    <p1510:client id="{3E240DEA-8482-4C40-82B9-6DA1360F8F0C}" v="83" dt="2021-12-20T12:37:09.710"/>
   </p1510:revLst>
 </p1510:revInfo>
 </file>
@@ -403,23 +405,31 @@
   </pc:docChgLst>
   <pc:docChgLst>
     <pc:chgData name="noh taehyun" userId="26ea3cd8016ad7de" providerId="LiveId" clId="{3E240DEA-8482-4C40-82B9-6DA1360F8F0C}"/>
-    <pc:docChg chg="custSel modSld">
-      <pc:chgData name="noh taehyun" userId="26ea3cd8016ad7de" providerId="LiveId" clId="{3E240DEA-8482-4C40-82B9-6DA1360F8F0C}" dt="2021-12-20T12:19:16.339" v="68" actId="1076"/>
+    <pc:docChg chg="custSel addSld modSld">
+      <pc:chgData name="noh taehyun" userId="26ea3cd8016ad7de" providerId="LiveId" clId="{3E240DEA-8482-4C40-82B9-6DA1360F8F0C}" dt="2021-12-20T12:37:13.109" v="745" actId="14100"/>
       <pc:docMkLst>
         <pc:docMk/>
       </pc:docMkLst>
       <pc:sldChg chg="addSp delSp modSp mod">
-        <pc:chgData name="noh taehyun" userId="26ea3cd8016ad7de" providerId="LiveId" clId="{3E240DEA-8482-4C40-82B9-6DA1360F8F0C}" dt="2021-12-20T12:19:16.339" v="68" actId="1076"/>
+        <pc:chgData name="noh taehyun" userId="26ea3cd8016ad7de" providerId="LiveId" clId="{3E240DEA-8482-4C40-82B9-6DA1360F8F0C}" dt="2021-12-20T12:24:59.072" v="374" actId="1035"/>
         <pc:sldMkLst>
           <pc:docMk/>
           <pc:sldMk cId="2112404214" sldId="256"/>
         </pc:sldMkLst>
         <pc:spChg chg="mod">
-          <ac:chgData name="noh taehyun" userId="26ea3cd8016ad7de" providerId="LiveId" clId="{3E240DEA-8482-4C40-82B9-6DA1360F8F0C}" dt="2021-12-15T12:32:43.590" v="37" actId="14100"/>
+          <ac:chgData name="noh taehyun" userId="26ea3cd8016ad7de" providerId="LiveId" clId="{3E240DEA-8482-4C40-82B9-6DA1360F8F0C}" dt="2021-12-20T12:23:06.513" v="113" actId="20577"/>
           <ac:spMkLst>
             <pc:docMk/>
             <pc:sldMk cId="2112404214" sldId="256"/>
             <ac:spMk id="4" creationId="{0ADD3736-29C5-49A6-8C10-696896947644}"/>
+          </ac:spMkLst>
+        </pc:spChg>
+        <pc:spChg chg="add mod">
+          <ac:chgData name="noh taehyun" userId="26ea3cd8016ad7de" providerId="LiveId" clId="{3E240DEA-8482-4C40-82B9-6DA1360F8F0C}" dt="2021-12-20T12:24:59.072" v="374" actId="1035"/>
+          <ac:spMkLst>
+            <pc:docMk/>
+            <pc:sldMk cId="2112404214" sldId="256"/>
+            <ac:spMk id="5" creationId="{C93A92E2-22DF-4EE5-A3A0-EA27EB487ADE}"/>
           </ac:spMkLst>
         </pc:spChg>
         <pc:spChg chg="del">
@@ -486,8 +496,8 @@
             <ac:graphicFrameMk id="2" creationId="{93E09B59-6523-4EC4-A1C3-0BBD45A305A6}"/>
           </ac:graphicFrameMkLst>
         </pc:graphicFrameChg>
-        <pc:graphicFrameChg chg="add mod modGraphic">
-          <ac:chgData name="noh taehyun" userId="26ea3cd8016ad7de" providerId="LiveId" clId="{3E240DEA-8482-4C40-82B9-6DA1360F8F0C}" dt="2021-12-20T12:19:16.339" v="68" actId="1076"/>
+        <pc:graphicFrameChg chg="add del mod modGraphic">
+          <ac:chgData name="noh taehyun" userId="26ea3cd8016ad7de" providerId="LiveId" clId="{3E240DEA-8482-4C40-82B9-6DA1360F8F0C}" dt="2021-12-20T12:23:19.572" v="115" actId="21"/>
           <ac:graphicFrameMkLst>
             <pc:docMk/>
             <pc:sldMk cId="2112404214" sldId="256"/>
@@ -508,6 +518,139 @@
             <pc:docMk/>
             <pc:sldMk cId="2112404214" sldId="256"/>
             <ac:graphicFrameMk id="15" creationId="{44831AB8-9705-4702-B335-A0B65897355A}"/>
+          </ac:graphicFrameMkLst>
+        </pc:graphicFrameChg>
+      </pc:sldChg>
+      <pc:sldChg chg="addSp modSp">
+        <pc:chgData name="noh taehyun" userId="26ea3cd8016ad7de" providerId="LiveId" clId="{3E240DEA-8482-4C40-82B9-6DA1360F8F0C}" dt="2021-12-20T12:23:20.992" v="116"/>
+        <pc:sldMkLst>
+          <pc:docMk/>
+          <pc:sldMk cId="1390913482" sldId="257"/>
+        </pc:sldMkLst>
+        <pc:graphicFrameChg chg="add mod">
+          <ac:chgData name="noh taehyun" userId="26ea3cd8016ad7de" providerId="LiveId" clId="{3E240DEA-8482-4C40-82B9-6DA1360F8F0C}" dt="2021-12-20T12:23:20.992" v="116"/>
+          <ac:graphicFrameMkLst>
+            <pc:docMk/>
+            <pc:sldMk cId="1390913482" sldId="257"/>
+            <ac:graphicFrameMk id="10" creationId="{89799C5A-4EC5-4588-9885-84C2E8A04658}"/>
+          </ac:graphicFrameMkLst>
+        </pc:graphicFrameChg>
+      </pc:sldChg>
+      <pc:sldChg chg="addSp delSp modSp add mod">
+        <pc:chgData name="noh taehyun" userId="26ea3cd8016ad7de" providerId="LiveId" clId="{3E240DEA-8482-4C40-82B9-6DA1360F8F0C}" dt="2021-12-20T12:37:13.109" v="745" actId="14100"/>
+        <pc:sldMkLst>
+          <pc:docMk/>
+          <pc:sldMk cId="3174195744" sldId="258"/>
+        </pc:sldMkLst>
+        <pc:spChg chg="mod">
+          <ac:chgData name="noh taehyun" userId="26ea3cd8016ad7de" providerId="LiveId" clId="{3E240DEA-8482-4C40-82B9-6DA1360F8F0C}" dt="2021-12-20T12:37:13.109" v="745" actId="14100"/>
+          <ac:spMkLst>
+            <pc:docMk/>
+            <pc:sldMk cId="3174195744" sldId="258"/>
+            <ac:spMk id="4" creationId="{0ADD3736-29C5-49A6-8C10-696896947644}"/>
+          </ac:spMkLst>
+        </pc:spChg>
+        <pc:spChg chg="del">
+          <ac:chgData name="noh taehyun" userId="26ea3cd8016ad7de" providerId="LiveId" clId="{3E240DEA-8482-4C40-82B9-6DA1360F8F0C}" dt="2021-12-20T12:25:18.405" v="403" actId="478"/>
+          <ac:spMkLst>
+            <pc:docMk/>
+            <pc:sldMk cId="3174195744" sldId="258"/>
+            <ac:spMk id="5" creationId="{C93A92E2-22DF-4EE5-A3A0-EA27EB487ADE}"/>
+          </ac:spMkLst>
+        </pc:spChg>
+        <pc:spChg chg="add mod">
+          <ac:chgData name="noh taehyun" userId="26ea3cd8016ad7de" providerId="LiveId" clId="{3E240DEA-8482-4C40-82B9-6DA1360F8F0C}" dt="2021-12-20T12:32:16.149" v="622" actId="1076"/>
+          <ac:spMkLst>
+            <pc:docMk/>
+            <pc:sldMk cId="3174195744" sldId="258"/>
+            <ac:spMk id="9" creationId="{DC1B20BF-073D-4B20-98E3-481156AEAF51}"/>
+          </ac:spMkLst>
+        </pc:spChg>
+        <pc:spChg chg="add mod">
+          <ac:chgData name="noh taehyun" userId="26ea3cd8016ad7de" providerId="LiveId" clId="{3E240DEA-8482-4C40-82B9-6DA1360F8F0C}" dt="2021-12-20T12:31:27.438" v="493" actId="1076"/>
+          <ac:spMkLst>
+            <pc:docMk/>
+            <pc:sldMk cId="3174195744" sldId="258"/>
+            <ac:spMk id="10" creationId="{DBAC677F-A9C2-4E8D-BE66-B064004C4BFB}"/>
+          </ac:spMkLst>
+        </pc:spChg>
+        <pc:spChg chg="add mod">
+          <ac:chgData name="noh taehyun" userId="26ea3cd8016ad7de" providerId="LiveId" clId="{3E240DEA-8482-4C40-82B9-6DA1360F8F0C}" dt="2021-12-20T12:31:38.709" v="505" actId="20577"/>
+          <ac:spMkLst>
+            <pc:docMk/>
+            <pc:sldMk cId="3174195744" sldId="258"/>
+            <ac:spMk id="11" creationId="{FDB93A58-4B6C-4D20-A91A-B268BDB25892}"/>
+          </ac:spMkLst>
+        </pc:spChg>
+        <pc:graphicFrameChg chg="add del mod modGraphic">
+          <ac:chgData name="noh taehyun" userId="26ea3cd8016ad7de" providerId="LiveId" clId="{3E240DEA-8482-4C40-82B9-6DA1360F8F0C}" dt="2021-12-20T12:29:45.940" v="466" actId="478"/>
+          <ac:graphicFrameMkLst>
+            <pc:docMk/>
+            <pc:sldMk cId="3174195744" sldId="258"/>
+            <ac:graphicFrameMk id="2" creationId="{CFDA3F3C-129E-4843-9F16-F5A49667D8FF}"/>
+          </ac:graphicFrameMkLst>
+        </pc:graphicFrameChg>
+        <pc:graphicFrameChg chg="add del mod">
+          <ac:chgData name="noh taehyun" userId="26ea3cd8016ad7de" providerId="LiveId" clId="{3E240DEA-8482-4C40-82B9-6DA1360F8F0C}" dt="2021-12-20T12:27:58.486" v="456"/>
+          <ac:graphicFrameMkLst>
+            <pc:docMk/>
+            <pc:sldMk cId="3174195744" sldId="258"/>
+            <ac:graphicFrameMk id="3" creationId="{6F078589-ADC5-40F0-98C9-0195ED473F3A}"/>
+          </ac:graphicFrameMkLst>
+        </pc:graphicFrameChg>
+        <pc:graphicFrameChg chg="add mod modGraphic">
+          <ac:chgData name="noh taehyun" userId="26ea3cd8016ad7de" providerId="LiveId" clId="{3E240DEA-8482-4C40-82B9-6DA1360F8F0C}" dt="2021-12-20T12:32:29.133" v="626" actId="20577"/>
+          <ac:graphicFrameMkLst>
+            <pc:docMk/>
+            <pc:sldMk cId="3174195744" sldId="258"/>
+            <ac:graphicFrameMk id="6" creationId="{9CDCDF94-7ABE-4701-92B8-4D6C03F0A37E}"/>
+          </ac:graphicFrameMkLst>
+        </pc:graphicFrameChg>
+        <pc:graphicFrameChg chg="add del mod">
+          <ac:chgData name="noh taehyun" userId="26ea3cd8016ad7de" providerId="LiveId" clId="{3E240DEA-8482-4C40-82B9-6DA1360F8F0C}" dt="2021-12-20T12:28:47.218" v="461"/>
+          <ac:graphicFrameMkLst>
+            <pc:docMk/>
+            <pc:sldMk cId="3174195744" sldId="258"/>
+            <ac:graphicFrameMk id="7" creationId="{E6B3DECA-4989-492A-A938-897B733287C1}"/>
+          </ac:graphicFrameMkLst>
+        </pc:graphicFrameChg>
+        <pc:graphicFrameChg chg="add mod modGraphic">
+          <ac:chgData name="noh taehyun" userId="26ea3cd8016ad7de" providerId="LiveId" clId="{3E240DEA-8482-4C40-82B9-6DA1360F8F0C}" dt="2021-12-20T12:30:56.383" v="479" actId="1076"/>
+          <ac:graphicFrameMkLst>
+            <pc:docMk/>
+            <pc:sldMk cId="3174195744" sldId="258"/>
+            <ac:graphicFrameMk id="8" creationId="{56B5A83E-DF94-4B65-AF6F-6CB5B654711B}"/>
+          </ac:graphicFrameMkLst>
+        </pc:graphicFrameChg>
+      </pc:sldChg>
+      <pc:sldChg chg="modSp add mod">
+        <pc:chgData name="noh taehyun" userId="26ea3cd8016ad7de" providerId="LiveId" clId="{3E240DEA-8482-4C40-82B9-6DA1360F8F0C}" dt="2021-12-20T12:33:54.210" v="711" actId="20577"/>
+        <pc:sldMkLst>
+          <pc:docMk/>
+          <pc:sldMk cId="4002610447" sldId="259"/>
+        </pc:sldMkLst>
+        <pc:spChg chg="mod">
+          <ac:chgData name="noh taehyun" userId="26ea3cd8016ad7de" providerId="LiveId" clId="{3E240DEA-8482-4C40-82B9-6DA1360F8F0C}" dt="2021-12-20T12:33:54.210" v="711" actId="20577"/>
+          <ac:spMkLst>
+            <pc:docMk/>
+            <pc:sldMk cId="4002610447" sldId="259"/>
+            <ac:spMk id="9" creationId="{DC1B20BF-073D-4B20-98E3-481156AEAF51}"/>
+          </ac:spMkLst>
+        </pc:spChg>
+        <pc:graphicFrameChg chg="modGraphic">
+          <ac:chgData name="noh taehyun" userId="26ea3cd8016ad7de" providerId="LiveId" clId="{3E240DEA-8482-4C40-82B9-6DA1360F8F0C}" dt="2021-12-20T12:32:55.039" v="630" actId="207"/>
+          <ac:graphicFrameMkLst>
+            <pc:docMk/>
+            <pc:sldMk cId="4002610447" sldId="259"/>
+            <ac:graphicFrameMk id="6" creationId="{9CDCDF94-7ABE-4701-92B8-4D6C03F0A37E}"/>
+          </ac:graphicFrameMkLst>
+        </pc:graphicFrameChg>
+        <pc:graphicFrameChg chg="modGraphic">
+          <ac:chgData name="noh taehyun" userId="26ea3cd8016ad7de" providerId="LiveId" clId="{3E240DEA-8482-4C40-82B9-6DA1360F8F0C}" dt="2021-12-20T12:33:33.370" v="640" actId="20577"/>
+          <ac:graphicFrameMkLst>
+            <pc:docMk/>
+            <pc:sldMk cId="4002610447" sldId="259"/>
+            <ac:graphicFrameMk id="8" creationId="{56B5A83E-DF94-4B65-AF6F-6CB5B654711B}"/>
           </ac:graphicFrameMkLst>
         </pc:graphicFrameChg>
       </pc:sldChg>
@@ -3755,7 +3898,7 @@
         <p:spPr>
           <a:xfrm>
             <a:off x="312820" y="312821"/>
-            <a:ext cx="5478379" cy="584775"/>
+            <a:ext cx="6688055" cy="584775"/>
           </a:xfrm>
           <a:prstGeom prst="rect">
             <a:avLst/>
@@ -3782,7 +3925,7 @@
                   <a:schemeClr val="bg1"/>
                 </a:solidFill>
               </a:rPr>
-              <a:t>BFS </a:t>
+              <a:t>BFS(Breadth First Search)</a:t>
             </a:r>
             <a:r>
               <a:rPr lang="ko-KR" altLang="en-US" sz="3200" dirty="0">
@@ -3790,17 +3933,272 @@
                   <a:schemeClr val="bg1"/>
                 </a:solidFill>
               </a:rPr>
-              <a:t>알고리즘 프로세스</a:t>
+              <a:t>란</a:t>
+            </a:r>
+            <a:r>
+              <a:rPr lang="en-US" altLang="ko-KR" sz="3200" dirty="0">
+                <a:solidFill>
+                  <a:schemeClr val="bg1"/>
+                </a:solidFill>
+              </a:rPr>
+              <a:t>?</a:t>
+            </a:r>
+          </a:p>
+        </p:txBody>
+      </p:sp>
+      <p:sp>
+        <p:nvSpPr>
+          <p:cNvPr id="5" name="TextBox 4">
+            <a:extLst>
+              <a:ext uri="{FF2B5EF4-FFF2-40B4-BE49-F238E27FC236}">
+                <a16:creationId xmlns:a16="http://schemas.microsoft.com/office/drawing/2014/main" id="{C93A92E2-22DF-4EE5-A3A0-EA27EB487ADE}"/>
+              </a:ext>
+            </a:extLst>
+          </p:cNvPr>
+          <p:cNvSpPr txBox="1"/>
+          <p:nvPr/>
+        </p:nvSpPr>
+        <p:spPr>
+          <a:xfrm>
+            <a:off x="787226" y="1201331"/>
+            <a:ext cx="10842799" cy="1200329"/>
+          </a:xfrm>
+          <a:prstGeom prst="rect">
+            <a:avLst/>
+          </a:prstGeom>
+          <a:noFill/>
+        </p:spPr>
+        <p:txBody>
+          <a:bodyPr wrap="square" rtlCol="0">
+            <a:spAutoFit/>
+          </a:bodyPr>
+          <a:lstStyle/>
+          <a:p>
+            <a:pPr marL="342900" indent="-342900">
+              <a:buFont typeface="Arial" panose="020B0604020202020204" pitchFamily="34" charset="0"/>
+              <a:buChar char="•"/>
+            </a:pPr>
+            <a:r>
+              <a:rPr lang="ko-KR" altLang="en-US" sz="2400" dirty="0">
+                <a:solidFill>
+                  <a:schemeClr val="bg1">
+                    <a:lumMod val="95000"/>
+                  </a:schemeClr>
+                </a:solidFill>
+              </a:rPr>
+              <a:t>코딩테스트 단골 문제</a:t>
+            </a:r>
+            <a:r>
+              <a:rPr lang="en-US" altLang="ko-KR" sz="2400" dirty="0">
+                <a:solidFill>
+                  <a:schemeClr val="bg1">
+                    <a:lumMod val="95000"/>
+                  </a:schemeClr>
+                </a:solidFill>
+              </a:rPr>
+              <a:t>.</a:t>
+            </a:r>
+          </a:p>
+          <a:p>
+            <a:pPr marL="342900" indent="-342900">
+              <a:buFont typeface="Arial" panose="020B0604020202020204" pitchFamily="34" charset="0"/>
+              <a:buChar char="•"/>
+            </a:pPr>
+            <a:r>
+              <a:rPr lang="en-US" altLang="ko-KR" sz="2400" dirty="0">
+                <a:solidFill>
+                  <a:schemeClr val="bg1">
+                    <a:lumMod val="95000"/>
+                  </a:schemeClr>
+                </a:solidFill>
+              </a:rPr>
+              <a:t>BFS </a:t>
+            </a:r>
+            <a:r>
+              <a:rPr lang="ko-KR" altLang="en-US" sz="2400" dirty="0">
+                <a:solidFill>
+                  <a:schemeClr val="bg1">
+                    <a:lumMod val="95000"/>
+                  </a:schemeClr>
+                </a:solidFill>
+              </a:rPr>
+              <a:t>코드는 </a:t>
+            </a:r>
+            <a:r>
+              <a:rPr lang="ko-KR" altLang="en-US" sz="2400" dirty="0" err="1">
+                <a:solidFill>
+                  <a:schemeClr val="bg1">
+                    <a:lumMod val="95000"/>
+                  </a:schemeClr>
+                </a:solidFill>
+              </a:rPr>
+              <a:t>꿈속에서라도</a:t>
+            </a:r>
+            <a:r>
+              <a:rPr lang="ko-KR" altLang="en-US" sz="2400" dirty="0">
+                <a:solidFill>
+                  <a:schemeClr val="bg1">
+                    <a:lumMod val="95000"/>
+                  </a:schemeClr>
+                </a:solidFill>
+              </a:rPr>
+              <a:t> 짤 수 있을 정도로 익숙해져야 함</a:t>
+            </a:r>
+            <a:r>
+              <a:rPr lang="en-US" altLang="ko-KR" sz="2400" dirty="0">
+                <a:solidFill>
+                  <a:schemeClr val="bg1">
+                    <a:lumMod val="95000"/>
+                  </a:schemeClr>
+                </a:solidFill>
+              </a:rPr>
+              <a:t>.</a:t>
+            </a:r>
+          </a:p>
+          <a:p>
+            <a:pPr marL="342900" indent="-342900">
+              <a:buFont typeface="Arial" panose="020B0604020202020204" pitchFamily="34" charset="0"/>
+              <a:buChar char="•"/>
+            </a:pPr>
+            <a:r>
+              <a:rPr lang="ko-KR" altLang="en-US" sz="2400" dirty="0">
+                <a:solidFill>
+                  <a:schemeClr val="bg1">
+                    <a:lumMod val="95000"/>
+                  </a:schemeClr>
+                </a:solidFill>
+              </a:rPr>
+              <a:t>다차원 배열에서 각 칸을 방문할 때 너비를 우선으로 방문하는 알고리즘</a:t>
+            </a:r>
+            <a:r>
+              <a:rPr lang="en-US" altLang="ko-KR" sz="2400" dirty="0">
+                <a:solidFill>
+                  <a:schemeClr val="bg1">
+                    <a:lumMod val="95000"/>
+                  </a:schemeClr>
+                </a:solidFill>
+              </a:rPr>
+              <a:t>. </a:t>
+            </a:r>
+            <a:endParaRPr lang="ko-KR" altLang="en-US" sz="2400" dirty="0">
+              <a:solidFill>
+                <a:schemeClr val="bg1">
+                  <a:lumMod val="95000"/>
+                </a:schemeClr>
+              </a:solidFill>
+            </a:endParaRPr>
+          </a:p>
+        </p:txBody>
+      </p:sp>
+    </p:spTree>
+    <p:extLst>
+      <p:ext uri="{BB962C8B-B14F-4D97-AF65-F5344CB8AC3E}">
+        <p14:creationId xmlns:p14="http://schemas.microsoft.com/office/powerpoint/2010/main" val="2112404214"/>
+      </p:ext>
+    </p:extLst>
+  </p:cSld>
+  <p:clrMapOvr>
+    <a:masterClrMapping/>
+  </p:clrMapOvr>
+</p:sld>
+</file>
+
+<file path=ppt/slides/slide2.xml><?xml version="1.0" encoding="utf-8"?>
+<p:sld xmlns:a="http://schemas.openxmlformats.org/drawingml/2006/main" xmlns:r="http://schemas.openxmlformats.org/officeDocument/2006/relationships" xmlns:p="http://schemas.openxmlformats.org/presentationml/2006/main">
+  <p:cSld>
+    <p:bg>
+      <p:bgPr>
+        <a:solidFill>
+          <a:schemeClr val="tx2">
+            <a:lumMod val="50000"/>
+          </a:schemeClr>
+        </a:solidFill>
+        <a:effectLst/>
+      </p:bgPr>
+    </p:bg>
+    <p:spTree>
+      <p:nvGrpSpPr>
+        <p:cNvPr id="1" name=""/>
+        <p:cNvGrpSpPr/>
+        <p:nvPr/>
+      </p:nvGrpSpPr>
+      <p:grpSpPr>
+        <a:xfrm>
+          <a:off x="0" y="0"/>
+          <a:ext cx="0" cy="0"/>
+          <a:chOff x="0" y="0"/>
+          <a:chExt cx="0" cy="0"/>
+        </a:xfrm>
+      </p:grpSpPr>
+      <p:sp>
+        <p:nvSpPr>
+          <p:cNvPr id="4" name="TextBox 3">
+            <a:extLst>
+              <a:ext uri="{FF2B5EF4-FFF2-40B4-BE49-F238E27FC236}">
+                <a16:creationId xmlns:a16="http://schemas.microsoft.com/office/drawing/2014/main" id="{0ADD3736-29C5-49A6-8C10-696896947644}"/>
+              </a:ext>
+            </a:extLst>
+          </p:cNvPr>
+          <p:cNvSpPr txBox="1"/>
+          <p:nvPr/>
+        </p:nvSpPr>
+        <p:spPr>
+          <a:xfrm>
+            <a:off x="312820" y="312821"/>
+            <a:ext cx="8001641" cy="584775"/>
+          </a:xfrm>
+          <a:prstGeom prst="rect">
+            <a:avLst/>
+          </a:prstGeom>
+          <a:noFill/>
+        </p:spPr>
+        <p:txBody>
+          <a:bodyPr wrap="square" rtlCol="0">
+            <a:spAutoFit/>
+          </a:bodyPr>
+          <a:lstStyle/>
+          <a:p>
+            <a:r>
+              <a:rPr lang="ko-KR" altLang="en-US" sz="3200" dirty="0">
+                <a:solidFill>
+                  <a:schemeClr val="bg1"/>
+                </a:solidFill>
+              </a:rPr>
+              <a:t>● 알고리즘 응용 </a:t>
+            </a:r>
+            <a:r>
+              <a:rPr lang="en-US" altLang="ko-KR" sz="3200" dirty="0">
+                <a:solidFill>
+                  <a:schemeClr val="bg1"/>
+                </a:solidFill>
+              </a:rPr>
+              <a:t>(</a:t>
+            </a:r>
+            <a:r>
+              <a:rPr lang="ko-KR" altLang="en-US" sz="3200" dirty="0">
+                <a:solidFill>
+                  <a:schemeClr val="bg1"/>
+                </a:solidFill>
+              </a:rPr>
+              <a:t>시작점이 여러 개</a:t>
+            </a:r>
+            <a:r>
+              <a:rPr lang="en-US" altLang="ko-KR" sz="3200" dirty="0">
+                <a:solidFill>
+                  <a:schemeClr val="bg1"/>
+                </a:solidFill>
+              </a:rPr>
+              <a:t>)</a:t>
             </a:r>
           </a:p>
         </p:txBody>
       </p:sp>
       <p:graphicFrame>
         <p:nvGraphicFramePr>
-          <p:cNvPr id="3" name="표 4">
+          <p:cNvPr id="6" name="표 4">
             <a:extLst>
               <a:ext uri="{FF2B5EF4-FFF2-40B4-BE49-F238E27FC236}">
-                <a16:creationId xmlns:a16="http://schemas.microsoft.com/office/drawing/2014/main" id="{EDFFB088-1171-48D6-92C9-2B2FF0090A98}"/>
+                <a16:creationId xmlns:a16="http://schemas.microsoft.com/office/drawing/2014/main" id="{9CDCDF94-7ABE-4701-92B8-4D6C03F0A37E}"/>
               </a:ext>
             </a:extLst>
           </p:cNvPr>
@@ -3810,14 +4208,14 @@
           <p:nvPr>
             <p:extLst>
               <p:ext uri="{D42A27DB-BD31-4B8C-83A1-F6EECF244321}">
-                <p14:modId xmlns:p14="http://schemas.microsoft.com/office/powerpoint/2010/main" val="223283873"/>
+                <p14:modId xmlns:p14="http://schemas.microsoft.com/office/powerpoint/2010/main" val="3489670264"/>
               </p:ext>
             </p:extLst>
           </p:nvPr>
         </p:nvGraphicFramePr>
         <p:xfrm>
-          <a:off x="1917399" y="1290885"/>
-          <a:ext cx="4707246" cy="2848540"/>
+          <a:off x="1031574" y="1395660"/>
+          <a:ext cx="4707246" cy="2736032"/>
         </p:xfrm>
         <a:graphic>
           <a:graphicData uri="http://schemas.openxmlformats.org/drawingml/2006/table">
@@ -3862,17 +4260,23 @@
                   </a:extLst>
                 </a:gridCol>
               </a:tblGrid>
-              <a:tr h="569708">
-                <a:tc>
-                  <a:txBody>
-                    <a:bodyPr/>
-                    <a:lstStyle/>
-                    <a:p>
-                      <a:pPr latinLnBrk="1"/>
-                      <a:endParaRPr lang="ko-KR" altLang="en-US" dirty="0"/>
-                    </a:p>
-                  </a:txBody>
-                  <a:tcPr>
+              <a:tr h="309315">
+                <a:tc>
+                  <a:txBody>
+                    <a:bodyPr/>
+                    <a:lstStyle/>
+                    <a:p>
+                      <a:pPr algn="ctr" latinLnBrk="1"/>
+                      <a:endParaRPr lang="ko-KR" altLang="en-US" sz="2400" dirty="0">
+                        <a:solidFill>
+                          <a:schemeClr val="bg1">
+                            <a:lumMod val="85000"/>
+                          </a:schemeClr>
+                        </a:solidFill>
+                      </a:endParaRPr>
+                    </a:p>
+                  </a:txBody>
+                  <a:tcPr anchor="ctr">
                     <a:lnB w="12700" cap="flat" cmpd="sng" algn="ctr">
                       <a:solidFill>
                         <a:schemeClr val="bg1"/>
@@ -3890,11 +4294,27 @@
                     <a:bodyPr/>
                     <a:lstStyle/>
                     <a:p>
-                      <a:pPr latinLnBrk="1"/>
-                      <a:endParaRPr lang="ko-KR" altLang="en-US" dirty="0"/>
-                    </a:p>
-                  </a:txBody>
-                  <a:tcPr>
+                      <a:pPr algn="ctr" latinLnBrk="1"/>
+                      <a:r>
+                        <a:rPr lang="en-US" altLang="ko-KR" sz="2400" dirty="0">
+                          <a:solidFill>
+                            <a:schemeClr val="bg1">
+                              <a:lumMod val="85000"/>
+                            </a:schemeClr>
+                          </a:solidFill>
+                        </a:rPr>
+                        <a:t>0</a:t>
+                      </a:r>
+                      <a:endParaRPr lang="ko-KR" altLang="en-US" sz="2400" dirty="0">
+                        <a:solidFill>
+                          <a:schemeClr val="bg1">
+                            <a:lumMod val="85000"/>
+                          </a:schemeClr>
+                        </a:solidFill>
+                      </a:endParaRPr>
+                    </a:p>
+                  </a:txBody>
+                  <a:tcPr anchor="ctr">
                     <a:lnB w="12700" cap="flat" cmpd="sng" algn="ctr">
                       <a:solidFill>
                         <a:schemeClr val="bg1"/>
@@ -3912,11 +4332,27 @@
                     <a:bodyPr/>
                     <a:lstStyle/>
                     <a:p>
-                      <a:pPr latinLnBrk="1"/>
-                      <a:endParaRPr lang="ko-KR" altLang="en-US" dirty="0"/>
-                    </a:p>
-                  </a:txBody>
-                  <a:tcPr>
+                      <a:pPr algn="ctr" latinLnBrk="1"/>
+                      <a:r>
+                        <a:rPr lang="en-US" altLang="ko-KR" sz="2400" dirty="0">
+                          <a:solidFill>
+                            <a:schemeClr val="bg1">
+                              <a:lumMod val="85000"/>
+                            </a:schemeClr>
+                          </a:solidFill>
+                        </a:rPr>
+                        <a:t>1</a:t>
+                      </a:r>
+                      <a:endParaRPr lang="ko-KR" altLang="en-US" sz="2400" dirty="0">
+                        <a:solidFill>
+                          <a:schemeClr val="bg1">
+                            <a:lumMod val="85000"/>
+                          </a:schemeClr>
+                        </a:solidFill>
+                      </a:endParaRPr>
+                    </a:p>
+                  </a:txBody>
+                  <a:tcPr anchor="ctr">
                     <a:lnB w="12700" cap="flat" cmpd="sng" algn="ctr">
                       <a:solidFill>
                         <a:schemeClr val="bg1"/>
@@ -3934,11 +4370,27 @@
                     <a:bodyPr/>
                     <a:lstStyle/>
                     <a:p>
-                      <a:pPr latinLnBrk="1"/>
-                      <a:endParaRPr lang="ko-KR" altLang="en-US" dirty="0"/>
-                    </a:p>
-                  </a:txBody>
-                  <a:tcPr>
+                      <a:pPr algn="ctr" latinLnBrk="1"/>
+                      <a:r>
+                        <a:rPr lang="en-US" altLang="ko-KR" sz="2400" dirty="0">
+                          <a:solidFill>
+                            <a:schemeClr val="bg1">
+                              <a:lumMod val="85000"/>
+                            </a:schemeClr>
+                          </a:solidFill>
+                        </a:rPr>
+                        <a:t>2</a:t>
+                      </a:r>
+                      <a:endParaRPr lang="ko-KR" altLang="en-US" sz="2400" dirty="0">
+                        <a:solidFill>
+                          <a:schemeClr val="bg1">
+                            <a:lumMod val="85000"/>
+                          </a:schemeClr>
+                        </a:solidFill>
+                      </a:endParaRPr>
+                    </a:p>
+                  </a:txBody>
+                  <a:tcPr anchor="ctr">
                     <a:lnB w="12700" cap="flat" cmpd="sng" algn="ctr">
                       <a:solidFill>
                         <a:schemeClr val="bg1"/>
@@ -3956,11 +4408,27 @@
                     <a:bodyPr/>
                     <a:lstStyle/>
                     <a:p>
-                      <a:pPr latinLnBrk="1"/>
-                      <a:endParaRPr lang="ko-KR" altLang="en-US" dirty="0"/>
-                    </a:p>
-                  </a:txBody>
-                  <a:tcPr>
+                      <a:pPr algn="ctr" latinLnBrk="1"/>
+                      <a:r>
+                        <a:rPr lang="en-US" altLang="ko-KR" sz="2400" dirty="0">
+                          <a:solidFill>
+                            <a:schemeClr val="bg1">
+                              <a:lumMod val="85000"/>
+                            </a:schemeClr>
+                          </a:solidFill>
+                        </a:rPr>
+                        <a:t>3</a:t>
+                      </a:r>
+                      <a:endParaRPr lang="ko-KR" altLang="en-US" sz="2400" dirty="0">
+                        <a:solidFill>
+                          <a:schemeClr val="bg1">
+                            <a:lumMod val="85000"/>
+                          </a:schemeClr>
+                        </a:solidFill>
+                      </a:endParaRPr>
+                    </a:p>
+                  </a:txBody>
+                  <a:tcPr anchor="ctr">
                     <a:lnB w="12700" cap="flat" cmpd="sng" algn="ctr">
                       <a:solidFill>
                         <a:schemeClr val="bg1"/>
@@ -3985,11 +4453,27 @@
                     <a:bodyPr/>
                     <a:lstStyle/>
                     <a:p>
-                      <a:pPr latinLnBrk="1"/>
-                      <a:endParaRPr lang="ko-KR" altLang="en-US" dirty="0"/>
-                    </a:p>
-                  </a:txBody>
-                  <a:tcPr>
+                      <a:pPr algn="ctr" latinLnBrk="1"/>
+                      <a:r>
+                        <a:rPr lang="en-US" altLang="ko-KR" sz="2400" dirty="0">
+                          <a:solidFill>
+                            <a:schemeClr val="bg1">
+                              <a:lumMod val="85000"/>
+                            </a:schemeClr>
+                          </a:solidFill>
+                        </a:rPr>
+                        <a:t>0</a:t>
+                      </a:r>
+                      <a:endParaRPr lang="ko-KR" altLang="en-US" sz="2400" dirty="0">
+                        <a:solidFill>
+                          <a:schemeClr val="bg1">
+                            <a:lumMod val="85000"/>
+                          </a:schemeClr>
+                        </a:solidFill>
+                      </a:endParaRPr>
+                    </a:p>
+                  </a:txBody>
+                  <a:tcPr anchor="ctr">
                     <a:lnT w="12700" cap="flat" cmpd="sng" algn="ctr">
                       <a:solidFill>
                         <a:schemeClr val="bg1"/>
@@ -4007,11 +4491,27 @@
                     <a:bodyPr/>
                     <a:lstStyle/>
                     <a:p>
-                      <a:pPr latinLnBrk="1"/>
-                      <a:endParaRPr lang="ko-KR" altLang="en-US" dirty="0"/>
-                    </a:p>
-                  </a:txBody>
-                  <a:tcPr>
+                      <a:pPr algn="ctr" latinLnBrk="1"/>
+                      <a:r>
+                        <a:rPr lang="en-US" altLang="ko-KR" sz="2400" dirty="0">
+                          <a:solidFill>
+                            <a:schemeClr val="bg1">
+                              <a:lumMod val="85000"/>
+                            </a:schemeClr>
+                          </a:solidFill>
+                        </a:rPr>
+                        <a:t>S</a:t>
+                      </a:r>
+                      <a:endParaRPr lang="ko-KR" altLang="en-US" sz="2400" dirty="0">
+                        <a:solidFill>
+                          <a:schemeClr val="bg1">
+                            <a:lumMod val="85000"/>
+                          </a:schemeClr>
+                        </a:solidFill>
+                      </a:endParaRPr>
+                    </a:p>
+                  </a:txBody>
+                  <a:tcPr anchor="ctr">
                     <a:lnT w="12700" cap="flat" cmpd="sng" algn="ctr">
                       <a:solidFill>
                         <a:schemeClr val="bg1"/>
@@ -4029,11 +4529,17 @@
                     <a:bodyPr/>
                     <a:lstStyle/>
                     <a:p>
-                      <a:pPr latinLnBrk="1"/>
-                      <a:endParaRPr lang="ko-KR" altLang="en-US" dirty="0"/>
-                    </a:p>
-                  </a:txBody>
-                  <a:tcPr>
+                      <a:pPr algn="ctr" latinLnBrk="1"/>
+                      <a:endParaRPr lang="ko-KR" altLang="en-US" sz="2400" dirty="0">
+                        <a:solidFill>
+                          <a:schemeClr val="bg1">
+                            <a:lumMod val="85000"/>
+                          </a:schemeClr>
+                        </a:solidFill>
+                      </a:endParaRPr>
+                    </a:p>
+                  </a:txBody>
+                  <a:tcPr anchor="ctr">
                     <a:lnT w="12700" cap="flat" cmpd="sng" algn="ctr">
                       <a:solidFill>
                         <a:schemeClr val="bg1"/>
@@ -4051,11 +4557,17 @@
                     <a:bodyPr/>
                     <a:lstStyle/>
                     <a:p>
-                      <a:pPr latinLnBrk="1"/>
-                      <a:endParaRPr lang="ko-KR" altLang="en-US" dirty="0"/>
-                    </a:p>
-                  </a:txBody>
-                  <a:tcPr>
+                      <a:pPr algn="ctr" latinLnBrk="1"/>
+                      <a:endParaRPr lang="ko-KR" altLang="en-US" sz="2400" dirty="0">
+                        <a:solidFill>
+                          <a:schemeClr val="bg1">
+                            <a:lumMod val="85000"/>
+                          </a:schemeClr>
+                        </a:solidFill>
+                      </a:endParaRPr>
+                    </a:p>
+                  </a:txBody>
+                  <a:tcPr anchor="ctr">
                     <a:lnT w="12700" cap="flat" cmpd="sng" algn="ctr">
                       <a:solidFill>
                         <a:schemeClr val="bg1"/>
@@ -4073,11 +4585,27 @@
                     <a:bodyPr/>
                     <a:lstStyle/>
                     <a:p>
-                      <a:pPr latinLnBrk="1"/>
-                      <a:endParaRPr lang="ko-KR" altLang="en-US" dirty="0"/>
-                    </a:p>
-                  </a:txBody>
-                  <a:tcPr>
+                      <a:pPr algn="ctr" latinLnBrk="1"/>
+                      <a:r>
+                        <a:rPr lang="en-US" altLang="ko-KR" sz="2400" dirty="0">
+                          <a:solidFill>
+                            <a:schemeClr val="bg1">
+                              <a:lumMod val="85000"/>
+                            </a:schemeClr>
+                          </a:solidFill>
+                        </a:rPr>
+                        <a:t>X</a:t>
+                      </a:r>
+                      <a:endParaRPr lang="ko-KR" altLang="en-US" sz="2400" dirty="0">
+                        <a:solidFill>
+                          <a:schemeClr val="bg1">
+                            <a:lumMod val="85000"/>
+                          </a:schemeClr>
+                        </a:solidFill>
+                      </a:endParaRPr>
+                    </a:p>
+                  </a:txBody>
+                  <a:tcPr anchor="ctr">
                     <a:lnT w="12700" cap="flat" cmpd="sng" algn="ctr">
                       <a:solidFill>
                         <a:schemeClr val="bg1"/>
@@ -4102,11 +4630,27 @@
                     <a:bodyPr/>
                     <a:lstStyle/>
                     <a:p>
-                      <a:pPr latinLnBrk="1"/>
-                      <a:endParaRPr lang="ko-KR" altLang="en-US" dirty="0"/>
-                    </a:p>
-                  </a:txBody>
-                  <a:tcPr>
+                      <a:pPr algn="ctr" latinLnBrk="1"/>
+                      <a:r>
+                        <a:rPr lang="en-US" altLang="ko-KR" sz="2400" dirty="0">
+                          <a:solidFill>
+                            <a:schemeClr val="bg1">
+                              <a:lumMod val="85000"/>
+                            </a:schemeClr>
+                          </a:solidFill>
+                        </a:rPr>
+                        <a:t>1</a:t>
+                      </a:r>
+                      <a:endParaRPr lang="ko-KR" altLang="en-US" sz="2400" dirty="0">
+                        <a:solidFill>
+                          <a:schemeClr val="bg1">
+                            <a:lumMod val="85000"/>
+                          </a:schemeClr>
+                        </a:solidFill>
+                      </a:endParaRPr>
+                    </a:p>
+                  </a:txBody>
+                  <a:tcPr anchor="ctr">
                     <a:noFill/>
                   </a:tcPr>
                 </a:tc>
@@ -4115,11 +4659,17 @@
                     <a:bodyPr/>
                     <a:lstStyle/>
                     <a:p>
-                      <a:pPr latinLnBrk="1"/>
-                      <a:endParaRPr lang="ko-KR" altLang="en-US" dirty="0"/>
-                    </a:p>
-                  </a:txBody>
-                  <a:tcPr>
+                      <a:pPr algn="ctr" latinLnBrk="1"/>
+                      <a:endParaRPr lang="ko-KR" altLang="en-US" sz="2400" dirty="0">
+                        <a:solidFill>
+                          <a:schemeClr val="bg1">
+                            <a:lumMod val="85000"/>
+                          </a:schemeClr>
+                        </a:solidFill>
+                      </a:endParaRPr>
+                    </a:p>
+                  </a:txBody>
+                  <a:tcPr anchor="ctr">
                     <a:noFill/>
                   </a:tcPr>
                 </a:tc>
@@ -4128,11 +4678,27 @@
                     <a:bodyPr/>
                     <a:lstStyle/>
                     <a:p>
-                      <a:pPr latinLnBrk="1"/>
-                      <a:endParaRPr lang="ko-KR" altLang="en-US" dirty="0"/>
-                    </a:p>
-                  </a:txBody>
-                  <a:tcPr>
+                      <a:pPr algn="ctr" latinLnBrk="1"/>
+                      <a:r>
+                        <a:rPr lang="en-US" altLang="ko-KR" sz="2400" dirty="0">
+                          <a:solidFill>
+                            <a:schemeClr val="bg1">
+                              <a:lumMod val="85000"/>
+                            </a:schemeClr>
+                          </a:solidFill>
+                        </a:rPr>
+                        <a:t>X</a:t>
+                      </a:r>
+                      <a:endParaRPr lang="ko-KR" altLang="en-US" sz="2400" dirty="0">
+                        <a:solidFill>
+                          <a:schemeClr val="bg1">
+                            <a:lumMod val="85000"/>
+                          </a:schemeClr>
+                        </a:solidFill>
+                      </a:endParaRPr>
+                    </a:p>
+                  </a:txBody>
+                  <a:tcPr anchor="ctr">
                     <a:noFill/>
                   </a:tcPr>
                 </a:tc>
@@ -4141,11 +4707,17 @@
                     <a:bodyPr/>
                     <a:lstStyle/>
                     <a:p>
-                      <a:pPr latinLnBrk="1"/>
-                      <a:endParaRPr lang="ko-KR" altLang="en-US" dirty="0"/>
-                    </a:p>
-                  </a:txBody>
-                  <a:tcPr>
+                      <a:pPr algn="ctr" latinLnBrk="1"/>
+                      <a:endParaRPr lang="ko-KR" altLang="en-US" sz="2400" dirty="0">
+                        <a:solidFill>
+                          <a:schemeClr val="bg1">
+                            <a:lumMod val="85000"/>
+                          </a:schemeClr>
+                        </a:solidFill>
+                      </a:endParaRPr>
+                    </a:p>
+                  </a:txBody>
+                  <a:tcPr anchor="ctr">
                     <a:noFill/>
                   </a:tcPr>
                 </a:tc>
@@ -4154,11 +4726,27 @@
                     <a:bodyPr/>
                     <a:lstStyle/>
                     <a:p>
-                      <a:pPr latinLnBrk="1"/>
-                      <a:endParaRPr lang="ko-KR" altLang="en-US" dirty="0"/>
-                    </a:p>
-                  </a:txBody>
-                  <a:tcPr>
+                      <a:pPr algn="ctr" latinLnBrk="1"/>
+                      <a:r>
+                        <a:rPr lang="en-US" altLang="ko-KR" sz="2400" dirty="0">
+                          <a:solidFill>
+                            <a:schemeClr val="bg1">
+                              <a:lumMod val="85000"/>
+                            </a:schemeClr>
+                          </a:solidFill>
+                        </a:rPr>
+                        <a:t>X</a:t>
+                      </a:r>
+                      <a:endParaRPr lang="ko-KR" altLang="en-US" sz="2400" dirty="0">
+                        <a:solidFill>
+                          <a:schemeClr val="bg1">
+                            <a:lumMod val="85000"/>
+                          </a:schemeClr>
+                        </a:solidFill>
+                      </a:endParaRPr>
+                    </a:p>
+                  </a:txBody>
+                  <a:tcPr anchor="ctr">
                     <a:noFill/>
                   </a:tcPr>
                 </a:tc>
@@ -4174,11 +4762,27 @@
                     <a:bodyPr/>
                     <a:lstStyle/>
                     <a:p>
-                      <a:pPr latinLnBrk="1"/>
-                      <a:endParaRPr lang="ko-KR" altLang="en-US" dirty="0"/>
-                    </a:p>
-                  </a:txBody>
-                  <a:tcPr>
+                      <a:pPr algn="ctr" latinLnBrk="1"/>
+                      <a:r>
+                        <a:rPr lang="en-US" altLang="ko-KR" sz="2400" dirty="0">
+                          <a:solidFill>
+                            <a:schemeClr val="bg1">
+                              <a:lumMod val="85000"/>
+                            </a:schemeClr>
+                          </a:solidFill>
+                        </a:rPr>
+                        <a:t>2</a:t>
+                      </a:r>
+                      <a:endParaRPr lang="ko-KR" altLang="en-US" sz="2400" dirty="0">
+                        <a:solidFill>
+                          <a:schemeClr val="bg1">
+                            <a:lumMod val="85000"/>
+                          </a:schemeClr>
+                        </a:solidFill>
+                      </a:endParaRPr>
+                    </a:p>
+                  </a:txBody>
+                  <a:tcPr anchor="ctr">
                     <a:noFill/>
                   </a:tcPr>
                 </a:tc>
@@ -4187,11 +4791,17 @@
                     <a:bodyPr/>
                     <a:lstStyle/>
                     <a:p>
-                      <a:pPr latinLnBrk="1"/>
-                      <a:endParaRPr lang="ko-KR" altLang="en-US"/>
-                    </a:p>
-                  </a:txBody>
-                  <a:tcPr>
+                      <a:pPr algn="ctr" latinLnBrk="1"/>
+                      <a:endParaRPr lang="ko-KR" altLang="en-US" sz="2400">
+                        <a:solidFill>
+                          <a:schemeClr val="bg1">
+                            <a:lumMod val="85000"/>
+                          </a:schemeClr>
+                        </a:solidFill>
+                      </a:endParaRPr>
+                    </a:p>
+                  </a:txBody>
+                  <a:tcPr anchor="ctr">
                     <a:noFill/>
                   </a:tcPr>
                 </a:tc>
@@ -4200,11 +4810,27 @@
                     <a:bodyPr/>
                     <a:lstStyle/>
                     <a:p>
-                      <a:pPr latinLnBrk="1"/>
-                      <a:endParaRPr lang="ko-KR" altLang="en-US"/>
-                    </a:p>
-                  </a:txBody>
-                  <a:tcPr>
+                      <a:pPr algn="ctr" latinLnBrk="1"/>
+                      <a:r>
+                        <a:rPr lang="en-US" altLang="ko-KR" sz="2400" dirty="0">
+                          <a:solidFill>
+                            <a:schemeClr val="bg1">
+                              <a:lumMod val="85000"/>
+                            </a:schemeClr>
+                          </a:solidFill>
+                        </a:rPr>
+                        <a:t>X</a:t>
+                      </a:r>
+                      <a:endParaRPr lang="ko-KR" altLang="en-US" sz="2400" dirty="0">
+                        <a:solidFill>
+                          <a:schemeClr val="bg1">
+                            <a:lumMod val="85000"/>
+                          </a:schemeClr>
+                        </a:solidFill>
+                      </a:endParaRPr>
+                    </a:p>
+                  </a:txBody>
+                  <a:tcPr anchor="ctr">
                     <a:noFill/>
                   </a:tcPr>
                 </a:tc>
@@ -4213,11 +4839,17 @@
                     <a:bodyPr/>
                     <a:lstStyle/>
                     <a:p>
-                      <a:pPr latinLnBrk="1"/>
-                      <a:endParaRPr lang="ko-KR" altLang="en-US" dirty="0"/>
-                    </a:p>
-                  </a:txBody>
-                  <a:tcPr>
+                      <a:pPr algn="ctr" latinLnBrk="1"/>
+                      <a:endParaRPr lang="ko-KR" altLang="en-US" sz="2400" dirty="0">
+                        <a:solidFill>
+                          <a:schemeClr val="bg1">
+                            <a:lumMod val="85000"/>
+                          </a:schemeClr>
+                        </a:solidFill>
+                      </a:endParaRPr>
+                    </a:p>
+                  </a:txBody>
+                  <a:tcPr anchor="ctr">
                     <a:noFill/>
                   </a:tcPr>
                 </a:tc>
@@ -4226,11 +4858,27 @@
                     <a:bodyPr/>
                     <a:lstStyle/>
                     <a:p>
-                      <a:pPr latinLnBrk="1"/>
-                      <a:endParaRPr lang="ko-KR" altLang="en-US" dirty="0"/>
-                    </a:p>
-                  </a:txBody>
-                  <a:tcPr>
+                      <a:pPr algn="ctr" latinLnBrk="1"/>
+                      <a:r>
+                        <a:rPr lang="en-US" altLang="ko-KR" sz="2400" dirty="0">
+                          <a:solidFill>
+                            <a:schemeClr val="bg1">
+                              <a:lumMod val="85000"/>
+                            </a:schemeClr>
+                          </a:solidFill>
+                        </a:rPr>
+                        <a:t>X</a:t>
+                      </a:r>
+                      <a:endParaRPr lang="ko-KR" altLang="en-US" sz="2400" dirty="0">
+                        <a:solidFill>
+                          <a:schemeClr val="bg1">
+                            <a:lumMod val="85000"/>
+                          </a:schemeClr>
+                        </a:solidFill>
+                      </a:endParaRPr>
+                    </a:p>
+                  </a:txBody>
+                  <a:tcPr anchor="ctr">
                     <a:noFill/>
                   </a:tcPr>
                 </a:tc>
@@ -4246,11 +4894,27 @@
                     <a:bodyPr/>
                     <a:lstStyle/>
                     <a:p>
-                      <a:pPr latinLnBrk="1"/>
-                      <a:endParaRPr lang="ko-KR" altLang="en-US" dirty="0"/>
-                    </a:p>
-                  </a:txBody>
-                  <a:tcPr>
+                      <a:pPr algn="ctr" latinLnBrk="1"/>
+                      <a:r>
+                        <a:rPr lang="en-US" altLang="ko-KR" sz="2400" dirty="0">
+                          <a:solidFill>
+                            <a:schemeClr val="bg1">
+                              <a:lumMod val="85000"/>
+                            </a:schemeClr>
+                          </a:solidFill>
+                        </a:rPr>
+                        <a:t>3</a:t>
+                      </a:r>
+                      <a:endParaRPr lang="ko-KR" altLang="en-US" sz="2400" dirty="0">
+                        <a:solidFill>
+                          <a:schemeClr val="bg1">
+                            <a:lumMod val="85000"/>
+                          </a:schemeClr>
+                        </a:solidFill>
+                      </a:endParaRPr>
+                    </a:p>
+                  </a:txBody>
+                  <a:tcPr anchor="ctr">
                     <a:noFill/>
                   </a:tcPr>
                 </a:tc>
@@ -4259,11 +4923,17 @@
                     <a:bodyPr/>
                     <a:lstStyle/>
                     <a:p>
-                      <a:pPr latinLnBrk="1"/>
-                      <a:endParaRPr lang="ko-KR" altLang="en-US"/>
-                    </a:p>
-                  </a:txBody>
-                  <a:tcPr>
+                      <a:pPr algn="ctr" latinLnBrk="1"/>
+                      <a:endParaRPr lang="ko-KR" altLang="en-US" sz="2400">
+                        <a:solidFill>
+                          <a:schemeClr val="bg1">
+                            <a:lumMod val="85000"/>
+                          </a:schemeClr>
+                        </a:solidFill>
+                      </a:endParaRPr>
+                    </a:p>
+                  </a:txBody>
+                  <a:tcPr anchor="ctr">
                     <a:noFill/>
                   </a:tcPr>
                 </a:tc>
@@ -4272,11 +4942,27 @@
                     <a:bodyPr/>
                     <a:lstStyle/>
                     <a:p>
-                      <a:pPr latinLnBrk="1"/>
-                      <a:endParaRPr lang="ko-KR" altLang="en-US"/>
-                    </a:p>
-                  </a:txBody>
-                  <a:tcPr>
+                      <a:pPr algn="ctr" latinLnBrk="1"/>
+                      <a:r>
+                        <a:rPr lang="en-US" altLang="ko-KR" sz="2400" dirty="0">
+                          <a:solidFill>
+                            <a:schemeClr val="bg1">
+                              <a:lumMod val="85000"/>
+                            </a:schemeClr>
+                          </a:solidFill>
+                        </a:rPr>
+                        <a:t>X</a:t>
+                      </a:r>
+                      <a:endParaRPr lang="ko-KR" altLang="en-US" sz="2400" dirty="0">
+                        <a:solidFill>
+                          <a:schemeClr val="bg1">
+                            <a:lumMod val="85000"/>
+                          </a:schemeClr>
+                        </a:solidFill>
+                      </a:endParaRPr>
+                    </a:p>
+                  </a:txBody>
+                  <a:tcPr anchor="ctr">
                     <a:noFill/>
                   </a:tcPr>
                 </a:tc>
@@ -4285,11 +4971,27 @@
                     <a:bodyPr/>
                     <a:lstStyle/>
                     <a:p>
-                      <a:pPr latinLnBrk="1"/>
-                      <a:endParaRPr lang="ko-KR" altLang="en-US" dirty="0"/>
-                    </a:p>
-                  </a:txBody>
-                  <a:tcPr>
+                      <a:pPr algn="ctr" latinLnBrk="1"/>
+                      <a:r>
+                        <a:rPr lang="en-US" altLang="ko-KR" sz="2400" dirty="0">
+                          <a:solidFill>
+                            <a:schemeClr val="bg1">
+                              <a:lumMod val="85000"/>
+                            </a:schemeClr>
+                          </a:solidFill>
+                        </a:rPr>
+                        <a:t>E</a:t>
+                      </a:r>
+                      <a:endParaRPr lang="ko-KR" altLang="en-US" sz="2400" dirty="0">
+                        <a:solidFill>
+                          <a:schemeClr val="bg1">
+                            <a:lumMod val="85000"/>
+                          </a:schemeClr>
+                        </a:solidFill>
+                      </a:endParaRPr>
+                    </a:p>
+                  </a:txBody>
+                  <a:tcPr anchor="ctr">
                     <a:noFill/>
                   </a:tcPr>
                 </a:tc>
@@ -4298,11 +5000,27 @@
                     <a:bodyPr/>
                     <a:lstStyle/>
                     <a:p>
-                      <a:pPr latinLnBrk="1"/>
-                      <a:endParaRPr lang="ko-KR" altLang="en-US" dirty="0"/>
-                    </a:p>
-                  </a:txBody>
-                  <a:tcPr>
+                      <a:pPr algn="ctr" latinLnBrk="1"/>
+                      <a:r>
+                        <a:rPr lang="en-US" altLang="ko-KR" sz="2400" dirty="0">
+                          <a:solidFill>
+                            <a:schemeClr val="bg1">
+                              <a:lumMod val="85000"/>
+                            </a:schemeClr>
+                          </a:solidFill>
+                        </a:rPr>
+                        <a:t>X</a:t>
+                      </a:r>
+                      <a:endParaRPr lang="ko-KR" altLang="en-US" sz="2400" dirty="0">
+                        <a:solidFill>
+                          <a:schemeClr val="bg1">
+                            <a:lumMod val="85000"/>
+                          </a:schemeClr>
+                        </a:solidFill>
+                      </a:endParaRPr>
+                    </a:p>
+                  </a:txBody>
+                  <a:tcPr anchor="ctr">
                     <a:noFill/>
                   </a:tcPr>
                 </a:tc>
@@ -4316,10 +5034,916 @@
           </a:graphicData>
         </a:graphic>
       </p:graphicFrame>
+      <p:graphicFrame>
+        <p:nvGraphicFramePr>
+          <p:cNvPr id="8" name="표 7">
+            <a:extLst>
+              <a:ext uri="{FF2B5EF4-FFF2-40B4-BE49-F238E27FC236}">
+                <a16:creationId xmlns:a16="http://schemas.microsoft.com/office/drawing/2014/main" id="{56B5A83E-DF94-4B65-AF6F-6CB5B654711B}"/>
+              </a:ext>
+            </a:extLst>
+          </p:cNvPr>
+          <p:cNvGraphicFramePr>
+            <a:graphicFrameLocks noGrp="1"/>
+          </p:cNvGraphicFramePr>
+          <p:nvPr>
+            <p:extLst>
+              <p:ext uri="{D42A27DB-BD31-4B8C-83A1-F6EECF244321}">
+                <p14:modId xmlns:p14="http://schemas.microsoft.com/office/powerpoint/2010/main" val="642161753"/>
+              </p:ext>
+            </p:extLst>
+          </p:nvPr>
+        </p:nvGraphicFramePr>
+        <p:xfrm>
+          <a:off x="6096000" y="1995439"/>
+          <a:ext cx="5937799" cy="1331844"/>
+        </p:xfrm>
+        <a:graphic>
+          <a:graphicData uri="http://schemas.openxmlformats.org/drawingml/2006/table">
+            <a:tbl>
+              <a:tblPr/>
+              <a:tblGrid>
+                <a:gridCol w="848257">
+                  <a:extLst>
+                    <a:ext uri="{9D8B030D-6E8A-4147-A177-3AD203B41FA5}">
+                      <a16:colId xmlns:a16="http://schemas.microsoft.com/office/drawing/2014/main" val="1326124428"/>
+                    </a:ext>
+                  </a:extLst>
+                </a:gridCol>
+                <a:gridCol w="848257">
+                  <a:extLst>
+                    <a:ext uri="{9D8B030D-6E8A-4147-A177-3AD203B41FA5}">
+                      <a16:colId xmlns:a16="http://schemas.microsoft.com/office/drawing/2014/main" val="463827987"/>
+                    </a:ext>
+                  </a:extLst>
+                </a:gridCol>
+                <a:gridCol w="848257">
+                  <a:extLst>
+                    <a:ext uri="{9D8B030D-6E8A-4147-A177-3AD203B41FA5}">
+                      <a16:colId xmlns:a16="http://schemas.microsoft.com/office/drawing/2014/main" val="3419744236"/>
+                    </a:ext>
+                  </a:extLst>
+                </a:gridCol>
+                <a:gridCol w="848257">
+                  <a:extLst>
+                    <a:ext uri="{9D8B030D-6E8A-4147-A177-3AD203B41FA5}">
+                      <a16:colId xmlns:a16="http://schemas.microsoft.com/office/drawing/2014/main" val="2512096992"/>
+                    </a:ext>
+                  </a:extLst>
+                </a:gridCol>
+                <a:gridCol w="848257">
+                  <a:extLst>
+                    <a:ext uri="{9D8B030D-6E8A-4147-A177-3AD203B41FA5}">
+                      <a16:colId xmlns:a16="http://schemas.microsoft.com/office/drawing/2014/main" val="4232852297"/>
+                    </a:ext>
+                  </a:extLst>
+                </a:gridCol>
+                <a:gridCol w="848257">
+                  <a:extLst>
+                    <a:ext uri="{9D8B030D-6E8A-4147-A177-3AD203B41FA5}">
+                      <a16:colId xmlns:a16="http://schemas.microsoft.com/office/drawing/2014/main" val="4079026458"/>
+                    </a:ext>
+                  </a:extLst>
+                </a:gridCol>
+                <a:gridCol w="848257">
+                  <a:extLst>
+                    <a:ext uri="{9D8B030D-6E8A-4147-A177-3AD203B41FA5}">
+                      <a16:colId xmlns:a16="http://schemas.microsoft.com/office/drawing/2014/main" val="2076626843"/>
+                    </a:ext>
+                  </a:extLst>
+                </a:gridCol>
+              </a:tblGrid>
+              <a:tr h="665922">
+                <a:tc>
+                  <a:txBody>
+                    <a:bodyPr/>
+                    <a:lstStyle/>
+                    <a:p>
+                      <a:pPr latinLnBrk="1"/>
+                      <a:endParaRPr lang="ko-KR" altLang="en-US" dirty="0"/>
+                    </a:p>
+                  </a:txBody>
+                  <a:tcPr>
+                    <a:lnL w="12700" cap="flat" cmpd="sng" algn="ctr">
+                      <a:noFill/>
+                      <a:prstDash val="solid"/>
+                      <a:round/>
+                      <a:headEnd type="none" w="med" len="med"/>
+                      <a:tailEnd type="none" w="med" len="med"/>
+                    </a:lnL>
+                    <a:lnR w="12700" cap="flat" cmpd="sng" algn="ctr">
+                      <a:noFill/>
+                      <a:prstDash val="solid"/>
+                      <a:round/>
+                      <a:headEnd type="none" w="med" len="med"/>
+                      <a:tailEnd type="none" w="med" len="med"/>
+                    </a:lnR>
+                    <a:lnT w="12700" cmpd="sng">
+                      <a:solidFill>
+                        <a:schemeClr val="bg1">
+                          <a:lumMod val="85000"/>
+                        </a:schemeClr>
+                      </a:solidFill>
+                      <a:prstDash val="solid"/>
+                    </a:lnT>
+                    <a:lnB w="12700" cap="flat" cmpd="sng" algn="ctr">
+                      <a:noFill/>
+                      <a:prstDash val="solid"/>
+                      <a:round/>
+                      <a:headEnd type="none" w="med" len="med"/>
+                      <a:tailEnd type="none" w="med" len="med"/>
+                    </a:lnB>
+                  </a:tcPr>
+                </a:tc>
+                <a:tc>
+                  <a:txBody>
+                    <a:bodyPr/>
+                    <a:lstStyle/>
+                    <a:p>
+                      <a:pPr latinLnBrk="1"/>
+                      <a:endParaRPr lang="ko-KR" altLang="en-US" dirty="0"/>
+                    </a:p>
+                  </a:txBody>
+                  <a:tcPr>
+                    <a:lnL w="12700" cap="flat" cmpd="sng" algn="ctr">
+                      <a:noFill/>
+                      <a:prstDash val="solid"/>
+                      <a:round/>
+                      <a:headEnd type="none" w="med" len="med"/>
+                      <a:tailEnd type="none" w="med" len="med"/>
+                    </a:lnL>
+                    <a:lnR w="12700" cap="flat" cmpd="sng" algn="ctr">
+                      <a:noFill/>
+                      <a:prstDash val="solid"/>
+                      <a:round/>
+                      <a:headEnd type="none" w="med" len="med"/>
+                      <a:tailEnd type="none" w="med" len="med"/>
+                    </a:lnR>
+                    <a:lnT w="12700" cap="flat" cmpd="sng" algn="ctr">
+                      <a:solidFill>
+                        <a:schemeClr val="bg1">
+                          <a:lumMod val="85000"/>
+                        </a:schemeClr>
+                      </a:solidFill>
+                      <a:prstDash val="solid"/>
+                      <a:round/>
+                      <a:headEnd type="none" w="med" len="med"/>
+                      <a:tailEnd type="none" w="med" len="med"/>
+                    </a:lnT>
+                    <a:lnB w="12700" cap="flat" cmpd="sng" algn="ctr">
+                      <a:noFill/>
+                      <a:prstDash val="solid"/>
+                      <a:round/>
+                      <a:headEnd type="none" w="med" len="med"/>
+                      <a:tailEnd type="none" w="med" len="med"/>
+                    </a:lnB>
+                  </a:tcPr>
+                </a:tc>
+                <a:tc>
+                  <a:txBody>
+                    <a:bodyPr/>
+                    <a:lstStyle/>
+                    <a:p>
+                      <a:pPr latinLnBrk="1"/>
+                      <a:endParaRPr lang="ko-KR" altLang="en-US" dirty="0"/>
+                    </a:p>
+                  </a:txBody>
+                  <a:tcPr>
+                    <a:lnL w="12700" cap="flat" cmpd="sng" algn="ctr">
+                      <a:noFill/>
+                      <a:prstDash val="solid"/>
+                      <a:round/>
+                      <a:headEnd type="none" w="med" len="med"/>
+                      <a:tailEnd type="none" w="med" len="med"/>
+                    </a:lnL>
+                    <a:lnR w="12700" cap="flat" cmpd="sng" algn="ctr">
+                      <a:noFill/>
+                      <a:prstDash val="solid"/>
+                      <a:round/>
+                      <a:headEnd type="none" w="med" len="med"/>
+                      <a:tailEnd type="none" w="med" len="med"/>
+                    </a:lnR>
+                    <a:lnT w="12700" cap="flat" cmpd="sng" algn="ctr">
+                      <a:solidFill>
+                        <a:schemeClr val="bg1">
+                          <a:lumMod val="85000"/>
+                        </a:schemeClr>
+                      </a:solidFill>
+                      <a:prstDash val="solid"/>
+                      <a:round/>
+                      <a:headEnd type="none" w="med" len="med"/>
+                      <a:tailEnd type="none" w="med" len="med"/>
+                    </a:lnT>
+                    <a:lnB w="12700" cap="flat" cmpd="sng" algn="ctr">
+                      <a:noFill/>
+                      <a:prstDash val="solid"/>
+                      <a:round/>
+                      <a:headEnd type="none" w="med" len="med"/>
+                      <a:tailEnd type="none" w="med" len="med"/>
+                    </a:lnB>
+                  </a:tcPr>
+                </a:tc>
+                <a:tc>
+                  <a:txBody>
+                    <a:bodyPr/>
+                    <a:lstStyle/>
+                    <a:p>
+                      <a:pPr latinLnBrk="1"/>
+                      <a:endParaRPr lang="ko-KR" altLang="en-US" dirty="0"/>
+                    </a:p>
+                  </a:txBody>
+                  <a:tcPr>
+                    <a:lnL w="12700" cap="flat" cmpd="sng" algn="ctr">
+                      <a:noFill/>
+                      <a:prstDash val="solid"/>
+                      <a:round/>
+                      <a:headEnd type="none" w="med" len="med"/>
+                      <a:tailEnd type="none" w="med" len="med"/>
+                    </a:lnL>
+                    <a:lnR w="12700" cap="flat" cmpd="sng" algn="ctr">
+                      <a:noFill/>
+                      <a:prstDash val="solid"/>
+                      <a:round/>
+                      <a:headEnd type="none" w="med" len="med"/>
+                      <a:tailEnd type="none" w="med" len="med"/>
+                    </a:lnR>
+                    <a:lnT w="12700" cap="flat" cmpd="sng" algn="ctr">
+                      <a:solidFill>
+                        <a:schemeClr val="bg1">
+                          <a:lumMod val="85000"/>
+                        </a:schemeClr>
+                      </a:solidFill>
+                      <a:prstDash val="solid"/>
+                      <a:round/>
+                      <a:headEnd type="none" w="med" len="med"/>
+                      <a:tailEnd type="none" w="med" len="med"/>
+                    </a:lnT>
+                    <a:lnB w="12700" cap="flat" cmpd="sng" algn="ctr">
+                      <a:noFill/>
+                      <a:prstDash val="solid"/>
+                      <a:round/>
+                      <a:headEnd type="none" w="med" len="med"/>
+                      <a:tailEnd type="none" w="med" len="med"/>
+                    </a:lnB>
+                  </a:tcPr>
+                </a:tc>
+                <a:tc>
+                  <a:txBody>
+                    <a:bodyPr/>
+                    <a:lstStyle/>
+                    <a:p>
+                      <a:pPr latinLnBrk="1"/>
+                      <a:endParaRPr lang="ko-KR" altLang="en-US" dirty="0"/>
+                    </a:p>
+                  </a:txBody>
+                  <a:tcPr>
+                    <a:lnL w="12700" cap="flat" cmpd="sng" algn="ctr">
+                      <a:noFill/>
+                      <a:prstDash val="solid"/>
+                      <a:round/>
+                      <a:headEnd type="none" w="med" len="med"/>
+                      <a:tailEnd type="none" w="med" len="med"/>
+                    </a:lnL>
+                    <a:lnR w="12700" cap="flat" cmpd="sng" algn="ctr">
+                      <a:noFill/>
+                      <a:prstDash val="solid"/>
+                      <a:round/>
+                      <a:headEnd type="none" w="med" len="med"/>
+                      <a:tailEnd type="none" w="med" len="med"/>
+                    </a:lnR>
+                    <a:lnT w="12700" cap="flat" cmpd="sng" algn="ctr">
+                      <a:solidFill>
+                        <a:schemeClr val="bg1">
+                          <a:lumMod val="85000"/>
+                        </a:schemeClr>
+                      </a:solidFill>
+                      <a:prstDash val="solid"/>
+                      <a:round/>
+                      <a:headEnd type="none" w="med" len="med"/>
+                      <a:tailEnd type="none" w="med" len="med"/>
+                    </a:lnT>
+                    <a:lnB w="12700" cap="flat" cmpd="sng" algn="ctr">
+                      <a:noFill/>
+                      <a:prstDash val="solid"/>
+                      <a:round/>
+                      <a:headEnd type="none" w="med" len="med"/>
+                      <a:tailEnd type="none" w="med" len="med"/>
+                    </a:lnB>
+                  </a:tcPr>
+                </a:tc>
+                <a:tc>
+                  <a:txBody>
+                    <a:bodyPr/>
+                    <a:lstStyle/>
+                    <a:p>
+                      <a:pPr latinLnBrk="1"/>
+                      <a:endParaRPr lang="ko-KR" altLang="en-US" dirty="0"/>
+                    </a:p>
+                  </a:txBody>
+                  <a:tcPr>
+                    <a:lnL w="12700" cap="flat" cmpd="sng" algn="ctr">
+                      <a:noFill/>
+                      <a:prstDash val="solid"/>
+                      <a:round/>
+                      <a:headEnd type="none" w="med" len="med"/>
+                      <a:tailEnd type="none" w="med" len="med"/>
+                    </a:lnL>
+                    <a:lnR w="12700" cap="flat" cmpd="sng" algn="ctr">
+                      <a:noFill/>
+                      <a:prstDash val="solid"/>
+                      <a:round/>
+                      <a:headEnd type="none" w="med" len="med"/>
+                      <a:tailEnd type="none" w="med" len="med"/>
+                    </a:lnR>
+                    <a:lnT w="12700" cap="flat" cmpd="sng" algn="ctr">
+                      <a:solidFill>
+                        <a:schemeClr val="bg1">
+                          <a:lumMod val="85000"/>
+                        </a:schemeClr>
+                      </a:solidFill>
+                      <a:prstDash val="solid"/>
+                      <a:round/>
+                      <a:headEnd type="none" w="med" len="med"/>
+                      <a:tailEnd type="none" w="med" len="med"/>
+                    </a:lnT>
+                    <a:lnB w="12700" cap="flat" cmpd="sng" algn="ctr">
+                      <a:noFill/>
+                      <a:prstDash val="solid"/>
+                      <a:round/>
+                      <a:headEnd type="none" w="med" len="med"/>
+                      <a:tailEnd type="none" w="med" len="med"/>
+                    </a:lnB>
+                  </a:tcPr>
+                </a:tc>
+                <a:tc>
+                  <a:txBody>
+                    <a:bodyPr/>
+                    <a:lstStyle/>
+                    <a:p>
+                      <a:pPr latinLnBrk="1"/>
+                      <a:endParaRPr lang="ko-KR" altLang="en-US" dirty="0"/>
+                    </a:p>
+                  </a:txBody>
+                  <a:tcPr>
+                    <a:lnL w="12700" cap="flat" cmpd="sng" algn="ctr">
+                      <a:noFill/>
+                      <a:prstDash val="solid"/>
+                      <a:round/>
+                      <a:headEnd type="none" w="med" len="med"/>
+                      <a:tailEnd type="none" w="med" len="med"/>
+                    </a:lnL>
+                    <a:lnR w="12700" cap="flat" cmpd="sng" algn="ctr">
+                      <a:noFill/>
+                      <a:prstDash val="solid"/>
+                      <a:round/>
+                      <a:headEnd type="none" w="med" len="med"/>
+                      <a:tailEnd type="none" w="med" len="med"/>
+                    </a:lnR>
+                    <a:lnT w="12700" cap="flat" cmpd="sng" algn="ctr">
+                      <a:solidFill>
+                        <a:schemeClr val="bg1">
+                          <a:lumMod val="85000"/>
+                        </a:schemeClr>
+                      </a:solidFill>
+                      <a:prstDash val="solid"/>
+                      <a:round/>
+                      <a:headEnd type="none" w="med" len="med"/>
+                      <a:tailEnd type="none" w="med" len="med"/>
+                    </a:lnT>
+                    <a:lnB w="12700" cap="flat" cmpd="sng" algn="ctr">
+                      <a:noFill/>
+                      <a:prstDash val="solid"/>
+                      <a:round/>
+                      <a:headEnd type="none" w="med" len="med"/>
+                      <a:tailEnd type="none" w="med" len="med"/>
+                    </a:lnB>
+                  </a:tcPr>
+                </a:tc>
+                <a:extLst>
+                  <a:ext uri="{0D108BD9-81ED-4DB2-BD59-A6C34878D82A}">
+                    <a16:rowId xmlns:a16="http://schemas.microsoft.com/office/drawing/2014/main" val="1812318293"/>
+                  </a:ext>
+                </a:extLst>
+              </a:tr>
+              <a:tr h="665922">
+                <a:tc>
+                  <a:txBody>
+                    <a:bodyPr/>
+                    <a:lstStyle/>
+                    <a:p>
+                      <a:pPr latinLnBrk="1"/>
+                      <a:endParaRPr lang="ko-KR" altLang="en-US" dirty="0"/>
+                    </a:p>
+                  </a:txBody>
+                  <a:tcPr>
+                    <a:lnL w="12700" cap="flat" cmpd="sng" algn="ctr">
+                      <a:noFill/>
+                      <a:prstDash val="solid"/>
+                      <a:round/>
+                      <a:headEnd type="none" w="med" len="med"/>
+                      <a:tailEnd type="none" w="med" len="med"/>
+                    </a:lnL>
+                    <a:lnR w="12700" cap="flat" cmpd="sng" algn="ctr">
+                      <a:noFill/>
+                      <a:prstDash val="solid"/>
+                      <a:round/>
+                      <a:headEnd type="none" w="med" len="med"/>
+                      <a:tailEnd type="none" w="med" len="med"/>
+                    </a:lnR>
+                    <a:lnT w="12700" cap="flat" cmpd="sng" algn="ctr">
+                      <a:noFill/>
+                      <a:prstDash val="solid"/>
+                      <a:round/>
+                      <a:headEnd type="none" w="med" len="med"/>
+                      <a:tailEnd type="none" w="med" len="med"/>
+                    </a:lnT>
+                    <a:lnB w="12700" cmpd="sng">
+                      <a:solidFill>
+                        <a:schemeClr val="bg1">
+                          <a:lumMod val="85000"/>
+                        </a:schemeClr>
+                      </a:solidFill>
+                      <a:prstDash val="solid"/>
+                    </a:lnB>
+                  </a:tcPr>
+                </a:tc>
+                <a:tc>
+                  <a:txBody>
+                    <a:bodyPr/>
+                    <a:lstStyle/>
+                    <a:p>
+                      <a:pPr latinLnBrk="1"/>
+                      <a:endParaRPr lang="ko-KR" altLang="en-US" dirty="0"/>
+                    </a:p>
+                  </a:txBody>
+                  <a:tcPr>
+                    <a:lnL w="12700" cap="flat" cmpd="sng" algn="ctr">
+                      <a:noFill/>
+                      <a:prstDash val="solid"/>
+                      <a:round/>
+                      <a:headEnd type="none" w="med" len="med"/>
+                      <a:tailEnd type="none" w="med" len="med"/>
+                    </a:lnL>
+                    <a:lnR w="12700" cap="flat" cmpd="sng" algn="ctr">
+                      <a:noFill/>
+                      <a:prstDash val="solid"/>
+                      <a:round/>
+                      <a:headEnd type="none" w="med" len="med"/>
+                      <a:tailEnd type="none" w="med" len="med"/>
+                    </a:lnR>
+                    <a:lnT w="12700" cap="flat" cmpd="sng" algn="ctr">
+                      <a:noFill/>
+                      <a:prstDash val="solid"/>
+                      <a:round/>
+                      <a:headEnd type="none" w="med" len="med"/>
+                      <a:tailEnd type="none" w="med" len="med"/>
+                    </a:lnT>
+                    <a:lnB w="12700" cap="flat" cmpd="sng" algn="ctr">
+                      <a:solidFill>
+                        <a:schemeClr val="bg1">
+                          <a:lumMod val="85000"/>
+                        </a:schemeClr>
+                      </a:solidFill>
+                      <a:prstDash val="solid"/>
+                      <a:round/>
+                      <a:headEnd type="none" w="med" len="med"/>
+                      <a:tailEnd type="none" w="med" len="med"/>
+                    </a:lnB>
+                  </a:tcPr>
+                </a:tc>
+                <a:tc>
+                  <a:txBody>
+                    <a:bodyPr/>
+                    <a:lstStyle/>
+                    <a:p>
+                      <a:pPr latinLnBrk="1"/>
+                      <a:endParaRPr lang="ko-KR" altLang="en-US" dirty="0"/>
+                    </a:p>
+                  </a:txBody>
+                  <a:tcPr>
+                    <a:lnL w="12700" cap="flat" cmpd="sng" algn="ctr">
+                      <a:noFill/>
+                      <a:prstDash val="solid"/>
+                      <a:round/>
+                      <a:headEnd type="none" w="med" len="med"/>
+                      <a:tailEnd type="none" w="med" len="med"/>
+                    </a:lnL>
+                    <a:lnR w="12700" cap="flat" cmpd="sng" algn="ctr">
+                      <a:noFill/>
+                      <a:prstDash val="solid"/>
+                      <a:round/>
+                      <a:headEnd type="none" w="med" len="med"/>
+                      <a:tailEnd type="none" w="med" len="med"/>
+                    </a:lnR>
+                    <a:lnT w="12700" cap="flat" cmpd="sng" algn="ctr">
+                      <a:noFill/>
+                      <a:prstDash val="solid"/>
+                      <a:round/>
+                      <a:headEnd type="none" w="med" len="med"/>
+                      <a:tailEnd type="none" w="med" len="med"/>
+                    </a:lnT>
+                    <a:lnB w="12700" cap="flat" cmpd="sng" algn="ctr">
+                      <a:solidFill>
+                        <a:schemeClr val="bg1">
+                          <a:lumMod val="85000"/>
+                        </a:schemeClr>
+                      </a:solidFill>
+                      <a:prstDash val="solid"/>
+                      <a:round/>
+                      <a:headEnd type="none" w="med" len="med"/>
+                      <a:tailEnd type="none" w="med" len="med"/>
+                    </a:lnB>
+                  </a:tcPr>
+                </a:tc>
+                <a:tc>
+                  <a:txBody>
+                    <a:bodyPr/>
+                    <a:lstStyle/>
+                    <a:p>
+                      <a:pPr latinLnBrk="1"/>
+                      <a:endParaRPr lang="ko-KR" altLang="en-US" dirty="0"/>
+                    </a:p>
+                  </a:txBody>
+                  <a:tcPr>
+                    <a:lnL w="12700" cap="flat" cmpd="sng" algn="ctr">
+                      <a:noFill/>
+                      <a:prstDash val="solid"/>
+                      <a:round/>
+                      <a:headEnd type="none" w="med" len="med"/>
+                      <a:tailEnd type="none" w="med" len="med"/>
+                    </a:lnL>
+                    <a:lnR w="12700" cap="flat" cmpd="sng" algn="ctr">
+                      <a:noFill/>
+                      <a:prstDash val="solid"/>
+                      <a:round/>
+                      <a:headEnd type="none" w="med" len="med"/>
+                      <a:tailEnd type="none" w="med" len="med"/>
+                    </a:lnR>
+                    <a:lnT w="12700" cap="flat" cmpd="sng" algn="ctr">
+                      <a:noFill/>
+                      <a:prstDash val="solid"/>
+                      <a:round/>
+                      <a:headEnd type="none" w="med" len="med"/>
+                      <a:tailEnd type="none" w="med" len="med"/>
+                    </a:lnT>
+                    <a:lnB w="12700" cap="flat" cmpd="sng" algn="ctr">
+                      <a:solidFill>
+                        <a:schemeClr val="bg1">
+                          <a:lumMod val="85000"/>
+                        </a:schemeClr>
+                      </a:solidFill>
+                      <a:prstDash val="solid"/>
+                      <a:round/>
+                      <a:headEnd type="none" w="med" len="med"/>
+                      <a:tailEnd type="none" w="med" len="med"/>
+                    </a:lnB>
+                  </a:tcPr>
+                </a:tc>
+                <a:tc>
+                  <a:txBody>
+                    <a:bodyPr/>
+                    <a:lstStyle/>
+                    <a:p>
+                      <a:pPr latinLnBrk="1"/>
+                      <a:endParaRPr lang="ko-KR" altLang="en-US" dirty="0"/>
+                    </a:p>
+                  </a:txBody>
+                  <a:tcPr>
+                    <a:lnL w="12700" cap="flat" cmpd="sng" algn="ctr">
+                      <a:noFill/>
+                      <a:prstDash val="solid"/>
+                      <a:round/>
+                      <a:headEnd type="none" w="med" len="med"/>
+                      <a:tailEnd type="none" w="med" len="med"/>
+                    </a:lnL>
+                    <a:lnR w="12700" cap="flat" cmpd="sng" algn="ctr">
+                      <a:noFill/>
+                      <a:prstDash val="solid"/>
+                      <a:round/>
+                      <a:headEnd type="none" w="med" len="med"/>
+                      <a:tailEnd type="none" w="med" len="med"/>
+                    </a:lnR>
+                    <a:lnT w="12700" cap="flat" cmpd="sng" algn="ctr">
+                      <a:noFill/>
+                      <a:prstDash val="solid"/>
+                      <a:round/>
+                      <a:headEnd type="none" w="med" len="med"/>
+                      <a:tailEnd type="none" w="med" len="med"/>
+                    </a:lnT>
+                    <a:lnB w="12700" cap="flat" cmpd="sng" algn="ctr">
+                      <a:solidFill>
+                        <a:schemeClr val="bg1">
+                          <a:lumMod val="85000"/>
+                        </a:schemeClr>
+                      </a:solidFill>
+                      <a:prstDash val="solid"/>
+                      <a:round/>
+                      <a:headEnd type="none" w="med" len="med"/>
+                      <a:tailEnd type="none" w="med" len="med"/>
+                    </a:lnB>
+                  </a:tcPr>
+                </a:tc>
+                <a:tc>
+                  <a:txBody>
+                    <a:bodyPr/>
+                    <a:lstStyle/>
+                    <a:p>
+                      <a:pPr latinLnBrk="1"/>
+                      <a:endParaRPr lang="ko-KR" altLang="en-US" dirty="0"/>
+                    </a:p>
+                  </a:txBody>
+                  <a:tcPr>
+                    <a:lnL w="12700" cap="flat" cmpd="sng" algn="ctr">
+                      <a:noFill/>
+                      <a:prstDash val="solid"/>
+                      <a:round/>
+                      <a:headEnd type="none" w="med" len="med"/>
+                      <a:tailEnd type="none" w="med" len="med"/>
+                    </a:lnL>
+                    <a:lnR w="12700" cap="flat" cmpd="sng" algn="ctr">
+                      <a:noFill/>
+                      <a:prstDash val="solid"/>
+                      <a:round/>
+                      <a:headEnd type="none" w="med" len="med"/>
+                      <a:tailEnd type="none" w="med" len="med"/>
+                    </a:lnR>
+                    <a:lnT w="12700" cap="flat" cmpd="sng" algn="ctr">
+                      <a:noFill/>
+                      <a:prstDash val="solid"/>
+                      <a:round/>
+                      <a:headEnd type="none" w="med" len="med"/>
+                      <a:tailEnd type="none" w="med" len="med"/>
+                    </a:lnT>
+                    <a:lnB w="12700" cap="flat" cmpd="sng" algn="ctr">
+                      <a:solidFill>
+                        <a:schemeClr val="bg1">
+                          <a:lumMod val="85000"/>
+                        </a:schemeClr>
+                      </a:solidFill>
+                      <a:prstDash val="solid"/>
+                      <a:round/>
+                      <a:headEnd type="none" w="med" len="med"/>
+                      <a:tailEnd type="none" w="med" len="med"/>
+                    </a:lnB>
+                  </a:tcPr>
+                </a:tc>
+                <a:tc>
+                  <a:txBody>
+                    <a:bodyPr/>
+                    <a:lstStyle/>
+                    <a:p>
+                      <a:pPr latinLnBrk="1"/>
+                      <a:endParaRPr lang="ko-KR" altLang="en-US" dirty="0"/>
+                    </a:p>
+                  </a:txBody>
+                  <a:tcPr>
+                    <a:lnL w="12700" cap="flat" cmpd="sng" algn="ctr">
+                      <a:noFill/>
+                      <a:prstDash val="solid"/>
+                      <a:round/>
+                      <a:headEnd type="none" w="med" len="med"/>
+                      <a:tailEnd type="none" w="med" len="med"/>
+                    </a:lnL>
+                    <a:lnR w="12700" cap="flat" cmpd="sng" algn="ctr">
+                      <a:noFill/>
+                      <a:prstDash val="solid"/>
+                      <a:round/>
+                      <a:headEnd type="none" w="med" len="med"/>
+                      <a:tailEnd type="none" w="med" len="med"/>
+                    </a:lnR>
+                    <a:lnT w="12700" cap="flat" cmpd="sng" algn="ctr">
+                      <a:noFill/>
+                      <a:prstDash val="solid"/>
+                      <a:round/>
+                      <a:headEnd type="none" w="med" len="med"/>
+                      <a:tailEnd type="none" w="med" len="med"/>
+                    </a:lnT>
+                    <a:lnB w="12700" cap="flat" cmpd="sng" algn="ctr">
+                      <a:solidFill>
+                        <a:schemeClr val="bg1">
+                          <a:lumMod val="85000"/>
+                        </a:schemeClr>
+                      </a:solidFill>
+                      <a:prstDash val="solid"/>
+                      <a:round/>
+                      <a:headEnd type="none" w="med" len="med"/>
+                      <a:tailEnd type="none" w="med" len="med"/>
+                    </a:lnB>
+                  </a:tcPr>
+                </a:tc>
+                <a:extLst>
+                  <a:ext uri="{0D108BD9-81ED-4DB2-BD59-A6C34878D82A}">
+                    <a16:rowId xmlns:a16="http://schemas.microsoft.com/office/drawing/2014/main" val="2193693611"/>
+                  </a:ext>
+                </a:extLst>
+              </a:tr>
+            </a:tbl>
+          </a:graphicData>
+        </a:graphic>
+      </p:graphicFrame>
+      <p:sp>
+        <p:nvSpPr>
+          <p:cNvPr id="9" name="TextBox 8">
+            <a:extLst>
+              <a:ext uri="{FF2B5EF4-FFF2-40B4-BE49-F238E27FC236}">
+                <a16:creationId xmlns:a16="http://schemas.microsoft.com/office/drawing/2014/main" id="{DC1B20BF-073D-4B20-98E3-481156AEAF51}"/>
+              </a:ext>
+            </a:extLst>
+          </p:cNvPr>
+          <p:cNvSpPr txBox="1"/>
+          <p:nvPr/>
+        </p:nvSpPr>
+        <p:spPr>
+          <a:xfrm>
+            <a:off x="981879" y="4494700"/>
+            <a:ext cx="10155756" cy="830997"/>
+          </a:xfrm>
+          <a:prstGeom prst="rect">
+            <a:avLst/>
+          </a:prstGeom>
+          <a:noFill/>
+        </p:spPr>
+        <p:txBody>
+          <a:bodyPr wrap="square" rtlCol="0">
+            <a:spAutoFit/>
+          </a:bodyPr>
+          <a:lstStyle/>
+          <a:p>
+            <a:pPr marL="342900" indent="-342900">
+              <a:buFont typeface="Arial" panose="020B0604020202020204" pitchFamily="34" charset="0"/>
+              <a:buChar char="•"/>
+            </a:pPr>
+            <a:r>
+              <a:rPr lang="ko-KR" altLang="en-US" sz="2400" dirty="0">
+                <a:solidFill>
+                  <a:schemeClr val="bg1">
+                    <a:lumMod val="95000"/>
+                  </a:schemeClr>
+                </a:solidFill>
+              </a:rPr>
+              <a:t>보드에서 </a:t>
+            </a:r>
+            <a:r>
+              <a:rPr lang="en-US" altLang="ko-KR" sz="2400" dirty="0">
+                <a:solidFill>
+                  <a:schemeClr val="bg1">
+                    <a:lumMod val="95000"/>
+                  </a:schemeClr>
+                </a:solidFill>
+              </a:rPr>
+              <a:t>X</a:t>
+            </a:r>
+            <a:r>
+              <a:rPr lang="ko-KR" altLang="en-US" sz="2400" dirty="0">
+                <a:solidFill>
+                  <a:schemeClr val="bg1">
+                    <a:lumMod val="95000"/>
+                  </a:schemeClr>
+                </a:solidFill>
+              </a:rPr>
+              <a:t>를 제외한 면적의 크기를 구하는 과정을 </a:t>
+            </a:r>
+            <a:r>
+              <a:rPr lang="en-US" altLang="ko-KR" sz="2400" dirty="0">
+                <a:solidFill>
+                  <a:schemeClr val="bg1">
+                    <a:lumMod val="95000"/>
+                  </a:schemeClr>
+                </a:solidFill>
+              </a:rPr>
+              <a:t>BFS</a:t>
+            </a:r>
+            <a:r>
+              <a:rPr lang="ko-KR" altLang="en-US" sz="2400" dirty="0">
+                <a:solidFill>
+                  <a:schemeClr val="bg1">
+                    <a:lumMod val="95000"/>
+                  </a:schemeClr>
+                </a:solidFill>
+              </a:rPr>
+              <a:t>를 통해 설명하겠음</a:t>
+            </a:r>
+            <a:r>
+              <a:rPr lang="en-US" altLang="ko-KR" sz="2400" dirty="0">
+                <a:solidFill>
+                  <a:schemeClr val="bg1">
+                    <a:lumMod val="95000"/>
+                  </a:schemeClr>
+                </a:solidFill>
+              </a:rPr>
+              <a:t>.</a:t>
+            </a:r>
+          </a:p>
+        </p:txBody>
+      </p:sp>
+      <p:sp>
+        <p:nvSpPr>
+          <p:cNvPr id="10" name="TextBox 9">
+            <a:extLst>
+              <a:ext uri="{FF2B5EF4-FFF2-40B4-BE49-F238E27FC236}">
+                <a16:creationId xmlns:a16="http://schemas.microsoft.com/office/drawing/2014/main" id="{DBAC677F-A9C2-4E8D-BE66-B064004C4BFB}"/>
+              </a:ext>
+            </a:extLst>
+          </p:cNvPr>
+          <p:cNvSpPr txBox="1"/>
+          <p:nvPr/>
+        </p:nvSpPr>
+        <p:spPr>
+          <a:xfrm>
+            <a:off x="8314461" y="1395660"/>
+            <a:ext cx="1704183" cy="461665"/>
+          </a:xfrm>
+          <a:prstGeom prst="rect">
+            <a:avLst/>
+          </a:prstGeom>
+          <a:noFill/>
+        </p:spPr>
+        <p:txBody>
+          <a:bodyPr wrap="square" rtlCol="0">
+            <a:spAutoFit/>
+          </a:bodyPr>
+          <a:lstStyle/>
+          <a:p>
+            <a:pPr marL="342900" indent="-342900">
+              <a:buFont typeface="Arial" panose="020B0604020202020204" pitchFamily="34" charset="0"/>
+              <a:buChar char="•"/>
+            </a:pPr>
+            <a:r>
+              <a:rPr lang="en-US" altLang="ko-KR" sz="2400" dirty="0">
+                <a:solidFill>
+                  <a:schemeClr val="bg1">
+                    <a:lumMod val="95000"/>
+                  </a:schemeClr>
+                </a:solidFill>
+              </a:rPr>
+              <a:t>Queue</a:t>
+            </a:r>
+            <a:endParaRPr lang="ko-KR" altLang="en-US" sz="2400" dirty="0">
+              <a:solidFill>
+                <a:schemeClr val="bg1">
+                  <a:lumMod val="95000"/>
+                </a:schemeClr>
+              </a:solidFill>
+            </a:endParaRPr>
+          </a:p>
+        </p:txBody>
+      </p:sp>
+      <p:sp>
+        <p:nvSpPr>
+          <p:cNvPr id="11" name="TextBox 10">
+            <a:extLst>
+              <a:ext uri="{FF2B5EF4-FFF2-40B4-BE49-F238E27FC236}">
+                <a16:creationId xmlns:a16="http://schemas.microsoft.com/office/drawing/2014/main" id="{FDB93A58-4B6C-4D20-A91A-B268BDB25892}"/>
+              </a:ext>
+            </a:extLst>
+          </p:cNvPr>
+          <p:cNvSpPr txBox="1"/>
+          <p:nvPr/>
+        </p:nvSpPr>
+        <p:spPr>
+          <a:xfrm>
+            <a:off x="2533105" y="897596"/>
+            <a:ext cx="1704183" cy="461665"/>
+          </a:xfrm>
+          <a:prstGeom prst="rect">
+            <a:avLst/>
+          </a:prstGeom>
+          <a:noFill/>
+        </p:spPr>
+        <p:txBody>
+          <a:bodyPr wrap="square" rtlCol="0">
+            <a:spAutoFit/>
+          </a:bodyPr>
+          <a:lstStyle/>
+          <a:p>
+            <a:pPr marL="342900" indent="-342900">
+              <a:buFont typeface="Arial" panose="020B0604020202020204" pitchFamily="34" charset="0"/>
+              <a:buChar char="•"/>
+            </a:pPr>
+            <a:r>
+              <a:rPr lang="en-US" altLang="ko-KR" sz="2400" dirty="0">
+                <a:solidFill>
+                  <a:schemeClr val="bg1">
+                    <a:lumMod val="95000"/>
+                  </a:schemeClr>
+                </a:solidFill>
+              </a:rPr>
+              <a:t>Board</a:t>
+            </a:r>
+            <a:endParaRPr lang="ko-KR" altLang="en-US" sz="2400" dirty="0">
+              <a:solidFill>
+                <a:schemeClr val="bg1">
+                  <a:lumMod val="95000"/>
+                </a:schemeClr>
+              </a:solidFill>
+            </a:endParaRPr>
+          </a:p>
+        </p:txBody>
+      </p:sp>
     </p:spTree>
     <p:extLst>
       <p:ext uri="{BB962C8B-B14F-4D97-AF65-F5344CB8AC3E}">
-        <p14:creationId xmlns:p14="http://schemas.microsoft.com/office/powerpoint/2010/main" val="2112404214"/>
+        <p14:creationId xmlns:p14="http://schemas.microsoft.com/office/powerpoint/2010/main" val="3174195744"/>
       </p:ext>
     </p:extLst>
   </p:cSld>
@@ -4329,7 +5953,1964 @@
 </p:sld>
 </file>
 
-<file path=ppt/slides/slide2.xml><?xml version="1.0" encoding="utf-8"?>
+<file path=ppt/slides/slide3.xml><?xml version="1.0" encoding="utf-8"?>
+<p:sld xmlns:a="http://schemas.openxmlformats.org/drawingml/2006/main" xmlns:r="http://schemas.openxmlformats.org/officeDocument/2006/relationships" xmlns:p="http://schemas.openxmlformats.org/presentationml/2006/main">
+  <p:cSld>
+    <p:bg>
+      <p:bgPr>
+        <a:solidFill>
+          <a:schemeClr val="tx2">
+            <a:lumMod val="50000"/>
+          </a:schemeClr>
+        </a:solidFill>
+        <a:effectLst/>
+      </p:bgPr>
+    </p:bg>
+    <p:spTree>
+      <p:nvGrpSpPr>
+        <p:cNvPr id="1" name=""/>
+        <p:cNvGrpSpPr/>
+        <p:nvPr/>
+      </p:nvGrpSpPr>
+      <p:grpSpPr>
+        <a:xfrm>
+          <a:off x="0" y="0"/>
+          <a:ext cx="0" cy="0"/>
+          <a:chOff x="0" y="0"/>
+          <a:chExt cx="0" cy="0"/>
+        </a:xfrm>
+      </p:grpSpPr>
+      <p:sp>
+        <p:nvSpPr>
+          <p:cNvPr id="4" name="TextBox 3">
+            <a:extLst>
+              <a:ext uri="{FF2B5EF4-FFF2-40B4-BE49-F238E27FC236}">
+                <a16:creationId xmlns:a16="http://schemas.microsoft.com/office/drawing/2014/main" id="{0ADD3736-29C5-49A6-8C10-696896947644}"/>
+              </a:ext>
+            </a:extLst>
+          </p:cNvPr>
+          <p:cNvSpPr txBox="1"/>
+          <p:nvPr/>
+        </p:nvSpPr>
+        <p:spPr>
+          <a:xfrm>
+            <a:off x="312820" y="312821"/>
+            <a:ext cx="6688055" cy="584775"/>
+          </a:xfrm>
+          <a:prstGeom prst="rect">
+            <a:avLst/>
+          </a:prstGeom>
+          <a:noFill/>
+        </p:spPr>
+        <p:txBody>
+          <a:bodyPr wrap="square" rtlCol="0">
+            <a:spAutoFit/>
+          </a:bodyPr>
+          <a:lstStyle/>
+          <a:p>
+            <a:r>
+              <a:rPr lang="ko-KR" altLang="en-US" sz="3200" dirty="0">
+                <a:solidFill>
+                  <a:schemeClr val="bg1"/>
+                </a:solidFill>
+              </a:rPr>
+              <a:t>● 알고리즘 프로세스</a:t>
+            </a:r>
+            <a:endParaRPr lang="en-US" altLang="ko-KR" sz="3200" dirty="0">
+              <a:solidFill>
+                <a:schemeClr val="bg1"/>
+              </a:solidFill>
+            </a:endParaRPr>
+          </a:p>
+        </p:txBody>
+      </p:sp>
+      <p:graphicFrame>
+        <p:nvGraphicFramePr>
+          <p:cNvPr id="6" name="표 4">
+            <a:extLst>
+              <a:ext uri="{FF2B5EF4-FFF2-40B4-BE49-F238E27FC236}">
+                <a16:creationId xmlns:a16="http://schemas.microsoft.com/office/drawing/2014/main" id="{9CDCDF94-7ABE-4701-92B8-4D6C03F0A37E}"/>
+              </a:ext>
+            </a:extLst>
+          </p:cNvPr>
+          <p:cNvGraphicFramePr>
+            <a:graphicFrameLocks noGrp="1"/>
+          </p:cNvGraphicFramePr>
+          <p:nvPr>
+            <p:extLst>
+              <p:ext uri="{D42A27DB-BD31-4B8C-83A1-F6EECF244321}">
+                <p14:modId xmlns:p14="http://schemas.microsoft.com/office/powerpoint/2010/main" val="1059176860"/>
+              </p:ext>
+            </p:extLst>
+          </p:nvPr>
+        </p:nvGraphicFramePr>
+        <p:xfrm>
+          <a:off x="1031574" y="1395660"/>
+          <a:ext cx="4707246" cy="2736032"/>
+        </p:xfrm>
+        <a:graphic>
+          <a:graphicData uri="http://schemas.openxmlformats.org/drawingml/2006/table">
+            <a:tbl>
+              <a:tblPr firstRow="1" bandRow="1">
+                <a:tableStyleId>{5C22544A-7EE6-4342-B048-85BDC9FD1C3A}</a:tableStyleId>
+              </a:tblPr>
+              <a:tblGrid>
+                <a:gridCol w="570674">
+                  <a:extLst>
+                    <a:ext uri="{9D8B030D-6E8A-4147-A177-3AD203B41FA5}">
+                      <a16:colId xmlns:a16="http://schemas.microsoft.com/office/drawing/2014/main" val="3490214599"/>
+                    </a:ext>
+                  </a:extLst>
+                </a:gridCol>
+                <a:gridCol w="1034143">
+                  <a:extLst>
+                    <a:ext uri="{9D8B030D-6E8A-4147-A177-3AD203B41FA5}">
+                      <a16:colId xmlns:a16="http://schemas.microsoft.com/office/drawing/2014/main" val="916022807"/>
+                    </a:ext>
+                  </a:extLst>
+                </a:gridCol>
+                <a:gridCol w="1034143">
+                  <a:extLst>
+                    <a:ext uri="{9D8B030D-6E8A-4147-A177-3AD203B41FA5}">
+                      <a16:colId xmlns:a16="http://schemas.microsoft.com/office/drawing/2014/main" val="1536341254"/>
+                    </a:ext>
+                  </a:extLst>
+                </a:gridCol>
+                <a:gridCol w="1034143">
+                  <a:extLst>
+                    <a:ext uri="{9D8B030D-6E8A-4147-A177-3AD203B41FA5}">
+                      <a16:colId xmlns:a16="http://schemas.microsoft.com/office/drawing/2014/main" val="3024976023"/>
+                    </a:ext>
+                  </a:extLst>
+                </a:gridCol>
+                <a:gridCol w="1034143">
+                  <a:extLst>
+                    <a:ext uri="{9D8B030D-6E8A-4147-A177-3AD203B41FA5}">
+                      <a16:colId xmlns:a16="http://schemas.microsoft.com/office/drawing/2014/main" val="2210718781"/>
+                    </a:ext>
+                  </a:extLst>
+                </a:gridCol>
+              </a:tblGrid>
+              <a:tr h="309315">
+                <a:tc>
+                  <a:txBody>
+                    <a:bodyPr/>
+                    <a:lstStyle/>
+                    <a:p>
+                      <a:pPr algn="ctr" latinLnBrk="1"/>
+                      <a:endParaRPr lang="ko-KR" altLang="en-US" sz="2400" dirty="0">
+                        <a:solidFill>
+                          <a:schemeClr val="bg1">
+                            <a:lumMod val="85000"/>
+                          </a:schemeClr>
+                        </a:solidFill>
+                      </a:endParaRPr>
+                    </a:p>
+                  </a:txBody>
+                  <a:tcPr anchor="ctr">
+                    <a:lnB w="12700" cap="flat" cmpd="sng" algn="ctr">
+                      <a:solidFill>
+                        <a:schemeClr val="bg1"/>
+                      </a:solidFill>
+                      <a:prstDash val="solid"/>
+                      <a:round/>
+                      <a:headEnd type="none" w="med" len="med"/>
+                      <a:tailEnd type="none" w="med" len="med"/>
+                    </a:lnB>
+                    <a:noFill/>
+                  </a:tcPr>
+                </a:tc>
+                <a:tc>
+                  <a:txBody>
+                    <a:bodyPr/>
+                    <a:lstStyle/>
+                    <a:p>
+                      <a:pPr algn="ctr" latinLnBrk="1"/>
+                      <a:r>
+                        <a:rPr lang="en-US" altLang="ko-KR" sz="2400" dirty="0">
+                          <a:solidFill>
+                            <a:schemeClr val="bg1">
+                              <a:lumMod val="85000"/>
+                            </a:schemeClr>
+                          </a:solidFill>
+                        </a:rPr>
+                        <a:t>0</a:t>
+                      </a:r>
+                      <a:endParaRPr lang="ko-KR" altLang="en-US" sz="2400" dirty="0">
+                        <a:solidFill>
+                          <a:schemeClr val="bg1">
+                            <a:lumMod val="85000"/>
+                          </a:schemeClr>
+                        </a:solidFill>
+                      </a:endParaRPr>
+                    </a:p>
+                  </a:txBody>
+                  <a:tcPr anchor="ctr">
+                    <a:lnB w="12700" cap="flat" cmpd="sng" algn="ctr">
+                      <a:solidFill>
+                        <a:schemeClr val="bg1"/>
+                      </a:solidFill>
+                      <a:prstDash val="solid"/>
+                      <a:round/>
+                      <a:headEnd type="none" w="med" len="med"/>
+                      <a:tailEnd type="none" w="med" len="med"/>
+                    </a:lnB>
+                    <a:noFill/>
+                  </a:tcPr>
+                </a:tc>
+                <a:tc>
+                  <a:txBody>
+                    <a:bodyPr/>
+                    <a:lstStyle/>
+                    <a:p>
+                      <a:pPr algn="ctr" latinLnBrk="1"/>
+                      <a:r>
+                        <a:rPr lang="en-US" altLang="ko-KR" sz="2400" dirty="0">
+                          <a:solidFill>
+                            <a:schemeClr val="bg1">
+                              <a:lumMod val="85000"/>
+                            </a:schemeClr>
+                          </a:solidFill>
+                        </a:rPr>
+                        <a:t>1</a:t>
+                      </a:r>
+                      <a:endParaRPr lang="ko-KR" altLang="en-US" sz="2400" dirty="0">
+                        <a:solidFill>
+                          <a:schemeClr val="bg1">
+                            <a:lumMod val="85000"/>
+                          </a:schemeClr>
+                        </a:solidFill>
+                      </a:endParaRPr>
+                    </a:p>
+                  </a:txBody>
+                  <a:tcPr anchor="ctr">
+                    <a:lnB w="12700" cap="flat" cmpd="sng" algn="ctr">
+                      <a:solidFill>
+                        <a:schemeClr val="bg1"/>
+                      </a:solidFill>
+                      <a:prstDash val="solid"/>
+                      <a:round/>
+                      <a:headEnd type="none" w="med" len="med"/>
+                      <a:tailEnd type="none" w="med" len="med"/>
+                    </a:lnB>
+                    <a:noFill/>
+                  </a:tcPr>
+                </a:tc>
+                <a:tc>
+                  <a:txBody>
+                    <a:bodyPr/>
+                    <a:lstStyle/>
+                    <a:p>
+                      <a:pPr algn="ctr" latinLnBrk="1"/>
+                      <a:r>
+                        <a:rPr lang="en-US" altLang="ko-KR" sz="2400" dirty="0">
+                          <a:solidFill>
+                            <a:schemeClr val="bg1">
+                              <a:lumMod val="85000"/>
+                            </a:schemeClr>
+                          </a:solidFill>
+                        </a:rPr>
+                        <a:t>2</a:t>
+                      </a:r>
+                      <a:endParaRPr lang="ko-KR" altLang="en-US" sz="2400" dirty="0">
+                        <a:solidFill>
+                          <a:schemeClr val="bg1">
+                            <a:lumMod val="85000"/>
+                          </a:schemeClr>
+                        </a:solidFill>
+                      </a:endParaRPr>
+                    </a:p>
+                  </a:txBody>
+                  <a:tcPr anchor="ctr">
+                    <a:lnB w="12700" cap="flat" cmpd="sng" algn="ctr">
+                      <a:solidFill>
+                        <a:schemeClr val="bg1"/>
+                      </a:solidFill>
+                      <a:prstDash val="solid"/>
+                      <a:round/>
+                      <a:headEnd type="none" w="med" len="med"/>
+                      <a:tailEnd type="none" w="med" len="med"/>
+                    </a:lnB>
+                    <a:noFill/>
+                  </a:tcPr>
+                </a:tc>
+                <a:tc>
+                  <a:txBody>
+                    <a:bodyPr/>
+                    <a:lstStyle/>
+                    <a:p>
+                      <a:pPr algn="ctr" latinLnBrk="1"/>
+                      <a:r>
+                        <a:rPr lang="en-US" altLang="ko-KR" sz="2400" dirty="0">
+                          <a:solidFill>
+                            <a:schemeClr val="bg1">
+                              <a:lumMod val="85000"/>
+                            </a:schemeClr>
+                          </a:solidFill>
+                        </a:rPr>
+                        <a:t>3</a:t>
+                      </a:r>
+                      <a:endParaRPr lang="ko-KR" altLang="en-US" sz="2400" dirty="0">
+                        <a:solidFill>
+                          <a:schemeClr val="bg1">
+                            <a:lumMod val="85000"/>
+                          </a:schemeClr>
+                        </a:solidFill>
+                      </a:endParaRPr>
+                    </a:p>
+                  </a:txBody>
+                  <a:tcPr anchor="ctr">
+                    <a:lnB w="12700" cap="flat" cmpd="sng" algn="ctr">
+                      <a:solidFill>
+                        <a:schemeClr val="bg1"/>
+                      </a:solidFill>
+                      <a:prstDash val="solid"/>
+                      <a:round/>
+                      <a:headEnd type="none" w="med" len="med"/>
+                      <a:tailEnd type="none" w="med" len="med"/>
+                    </a:lnB>
+                    <a:noFill/>
+                  </a:tcPr>
+                </a:tc>
+                <a:extLst>
+                  <a:ext uri="{0D108BD9-81ED-4DB2-BD59-A6C34878D82A}">
+                    <a16:rowId xmlns:a16="http://schemas.microsoft.com/office/drawing/2014/main" val="2732016016"/>
+                  </a:ext>
+                </a:extLst>
+              </a:tr>
+              <a:tr h="569708">
+                <a:tc>
+                  <a:txBody>
+                    <a:bodyPr/>
+                    <a:lstStyle/>
+                    <a:p>
+                      <a:pPr algn="ctr" latinLnBrk="1"/>
+                      <a:r>
+                        <a:rPr lang="en-US" altLang="ko-KR" sz="2400" dirty="0">
+                          <a:solidFill>
+                            <a:schemeClr val="bg1">
+                              <a:lumMod val="85000"/>
+                            </a:schemeClr>
+                          </a:solidFill>
+                        </a:rPr>
+                        <a:t>0</a:t>
+                      </a:r>
+                      <a:endParaRPr lang="ko-KR" altLang="en-US" sz="2400" dirty="0">
+                        <a:solidFill>
+                          <a:schemeClr val="bg1">
+                            <a:lumMod val="85000"/>
+                          </a:schemeClr>
+                        </a:solidFill>
+                      </a:endParaRPr>
+                    </a:p>
+                  </a:txBody>
+                  <a:tcPr anchor="ctr">
+                    <a:lnT w="12700" cap="flat" cmpd="sng" algn="ctr">
+                      <a:solidFill>
+                        <a:schemeClr val="bg1"/>
+                      </a:solidFill>
+                      <a:prstDash val="solid"/>
+                      <a:round/>
+                      <a:headEnd type="none" w="med" len="med"/>
+                      <a:tailEnd type="none" w="med" len="med"/>
+                    </a:lnT>
+                    <a:noFill/>
+                  </a:tcPr>
+                </a:tc>
+                <a:tc>
+                  <a:txBody>
+                    <a:bodyPr/>
+                    <a:lstStyle/>
+                    <a:p>
+                      <a:pPr algn="ctr" latinLnBrk="1"/>
+                      <a:r>
+                        <a:rPr lang="en-US" altLang="ko-KR" sz="2400" dirty="0">
+                          <a:solidFill>
+                            <a:schemeClr val="bg1">
+                              <a:lumMod val="85000"/>
+                            </a:schemeClr>
+                          </a:solidFill>
+                        </a:rPr>
+                        <a:t>S</a:t>
+                      </a:r>
+                      <a:endParaRPr lang="ko-KR" altLang="en-US" sz="2400" dirty="0">
+                        <a:solidFill>
+                          <a:schemeClr val="bg1">
+                            <a:lumMod val="85000"/>
+                          </a:schemeClr>
+                        </a:solidFill>
+                      </a:endParaRPr>
+                    </a:p>
+                  </a:txBody>
+                  <a:tcPr anchor="ctr">
+                    <a:lnT w="12700" cap="flat" cmpd="sng" algn="ctr">
+                      <a:solidFill>
+                        <a:schemeClr val="bg1"/>
+                      </a:solidFill>
+                      <a:prstDash val="solid"/>
+                      <a:round/>
+                      <a:headEnd type="none" w="med" len="med"/>
+                      <a:tailEnd type="none" w="med" len="med"/>
+                    </a:lnT>
+                    <a:solidFill>
+                      <a:schemeClr val="accent2"/>
+                    </a:solidFill>
+                  </a:tcPr>
+                </a:tc>
+                <a:tc>
+                  <a:txBody>
+                    <a:bodyPr/>
+                    <a:lstStyle/>
+                    <a:p>
+                      <a:pPr algn="ctr" latinLnBrk="1"/>
+                      <a:endParaRPr lang="ko-KR" altLang="en-US" sz="2400" dirty="0">
+                        <a:solidFill>
+                          <a:schemeClr val="bg1">
+                            <a:lumMod val="85000"/>
+                          </a:schemeClr>
+                        </a:solidFill>
+                      </a:endParaRPr>
+                    </a:p>
+                  </a:txBody>
+                  <a:tcPr anchor="ctr">
+                    <a:lnT w="12700" cap="flat" cmpd="sng" algn="ctr">
+                      <a:solidFill>
+                        <a:schemeClr val="bg1"/>
+                      </a:solidFill>
+                      <a:prstDash val="solid"/>
+                      <a:round/>
+                      <a:headEnd type="none" w="med" len="med"/>
+                      <a:tailEnd type="none" w="med" len="med"/>
+                    </a:lnT>
+                    <a:noFill/>
+                  </a:tcPr>
+                </a:tc>
+                <a:tc>
+                  <a:txBody>
+                    <a:bodyPr/>
+                    <a:lstStyle/>
+                    <a:p>
+                      <a:pPr algn="ctr" latinLnBrk="1"/>
+                      <a:endParaRPr lang="ko-KR" altLang="en-US" sz="2400" dirty="0">
+                        <a:solidFill>
+                          <a:schemeClr val="bg1">
+                            <a:lumMod val="85000"/>
+                          </a:schemeClr>
+                        </a:solidFill>
+                      </a:endParaRPr>
+                    </a:p>
+                  </a:txBody>
+                  <a:tcPr anchor="ctr">
+                    <a:lnT w="12700" cap="flat" cmpd="sng" algn="ctr">
+                      <a:solidFill>
+                        <a:schemeClr val="bg1"/>
+                      </a:solidFill>
+                      <a:prstDash val="solid"/>
+                      <a:round/>
+                      <a:headEnd type="none" w="med" len="med"/>
+                      <a:tailEnd type="none" w="med" len="med"/>
+                    </a:lnT>
+                    <a:noFill/>
+                  </a:tcPr>
+                </a:tc>
+                <a:tc>
+                  <a:txBody>
+                    <a:bodyPr/>
+                    <a:lstStyle/>
+                    <a:p>
+                      <a:pPr algn="ctr" latinLnBrk="1"/>
+                      <a:r>
+                        <a:rPr lang="en-US" altLang="ko-KR" sz="2400" dirty="0">
+                          <a:solidFill>
+                            <a:schemeClr val="bg1">
+                              <a:lumMod val="85000"/>
+                            </a:schemeClr>
+                          </a:solidFill>
+                        </a:rPr>
+                        <a:t>X</a:t>
+                      </a:r>
+                      <a:endParaRPr lang="ko-KR" altLang="en-US" sz="2400" dirty="0">
+                        <a:solidFill>
+                          <a:schemeClr val="bg1">
+                            <a:lumMod val="85000"/>
+                          </a:schemeClr>
+                        </a:solidFill>
+                      </a:endParaRPr>
+                    </a:p>
+                  </a:txBody>
+                  <a:tcPr anchor="ctr">
+                    <a:lnT w="12700" cap="flat" cmpd="sng" algn="ctr">
+                      <a:solidFill>
+                        <a:schemeClr val="bg1"/>
+                      </a:solidFill>
+                      <a:prstDash val="solid"/>
+                      <a:round/>
+                      <a:headEnd type="none" w="med" len="med"/>
+                      <a:tailEnd type="none" w="med" len="med"/>
+                    </a:lnT>
+                    <a:noFill/>
+                  </a:tcPr>
+                </a:tc>
+                <a:extLst>
+                  <a:ext uri="{0D108BD9-81ED-4DB2-BD59-A6C34878D82A}">
+                    <a16:rowId xmlns:a16="http://schemas.microsoft.com/office/drawing/2014/main" val="2769820276"/>
+                  </a:ext>
+                </a:extLst>
+              </a:tr>
+              <a:tr h="569708">
+                <a:tc>
+                  <a:txBody>
+                    <a:bodyPr/>
+                    <a:lstStyle/>
+                    <a:p>
+                      <a:pPr algn="ctr" latinLnBrk="1"/>
+                      <a:r>
+                        <a:rPr lang="en-US" altLang="ko-KR" sz="2400" dirty="0">
+                          <a:solidFill>
+                            <a:schemeClr val="bg1">
+                              <a:lumMod val="85000"/>
+                            </a:schemeClr>
+                          </a:solidFill>
+                        </a:rPr>
+                        <a:t>1</a:t>
+                      </a:r>
+                      <a:endParaRPr lang="ko-KR" altLang="en-US" sz="2400" dirty="0">
+                        <a:solidFill>
+                          <a:schemeClr val="bg1">
+                            <a:lumMod val="85000"/>
+                          </a:schemeClr>
+                        </a:solidFill>
+                      </a:endParaRPr>
+                    </a:p>
+                  </a:txBody>
+                  <a:tcPr anchor="ctr">
+                    <a:noFill/>
+                  </a:tcPr>
+                </a:tc>
+                <a:tc>
+                  <a:txBody>
+                    <a:bodyPr/>
+                    <a:lstStyle/>
+                    <a:p>
+                      <a:pPr algn="ctr" latinLnBrk="1"/>
+                      <a:endParaRPr lang="ko-KR" altLang="en-US" sz="2400" dirty="0">
+                        <a:solidFill>
+                          <a:schemeClr val="bg1">
+                            <a:lumMod val="85000"/>
+                          </a:schemeClr>
+                        </a:solidFill>
+                      </a:endParaRPr>
+                    </a:p>
+                  </a:txBody>
+                  <a:tcPr anchor="ctr">
+                    <a:noFill/>
+                  </a:tcPr>
+                </a:tc>
+                <a:tc>
+                  <a:txBody>
+                    <a:bodyPr/>
+                    <a:lstStyle/>
+                    <a:p>
+                      <a:pPr algn="ctr" latinLnBrk="1"/>
+                      <a:r>
+                        <a:rPr lang="en-US" altLang="ko-KR" sz="2400" dirty="0">
+                          <a:solidFill>
+                            <a:schemeClr val="bg1">
+                              <a:lumMod val="85000"/>
+                            </a:schemeClr>
+                          </a:solidFill>
+                        </a:rPr>
+                        <a:t>X</a:t>
+                      </a:r>
+                      <a:endParaRPr lang="ko-KR" altLang="en-US" sz="2400" dirty="0">
+                        <a:solidFill>
+                          <a:schemeClr val="bg1">
+                            <a:lumMod val="85000"/>
+                          </a:schemeClr>
+                        </a:solidFill>
+                      </a:endParaRPr>
+                    </a:p>
+                  </a:txBody>
+                  <a:tcPr anchor="ctr">
+                    <a:noFill/>
+                  </a:tcPr>
+                </a:tc>
+                <a:tc>
+                  <a:txBody>
+                    <a:bodyPr/>
+                    <a:lstStyle/>
+                    <a:p>
+                      <a:pPr algn="ctr" latinLnBrk="1"/>
+                      <a:endParaRPr lang="ko-KR" altLang="en-US" sz="2400" dirty="0">
+                        <a:solidFill>
+                          <a:schemeClr val="bg1">
+                            <a:lumMod val="85000"/>
+                          </a:schemeClr>
+                        </a:solidFill>
+                      </a:endParaRPr>
+                    </a:p>
+                  </a:txBody>
+                  <a:tcPr anchor="ctr">
+                    <a:noFill/>
+                  </a:tcPr>
+                </a:tc>
+                <a:tc>
+                  <a:txBody>
+                    <a:bodyPr/>
+                    <a:lstStyle/>
+                    <a:p>
+                      <a:pPr algn="ctr" latinLnBrk="1"/>
+                      <a:r>
+                        <a:rPr lang="en-US" altLang="ko-KR" sz="2400" dirty="0">
+                          <a:solidFill>
+                            <a:schemeClr val="bg1">
+                              <a:lumMod val="85000"/>
+                            </a:schemeClr>
+                          </a:solidFill>
+                        </a:rPr>
+                        <a:t>X</a:t>
+                      </a:r>
+                      <a:endParaRPr lang="ko-KR" altLang="en-US" sz="2400" dirty="0">
+                        <a:solidFill>
+                          <a:schemeClr val="bg1">
+                            <a:lumMod val="85000"/>
+                          </a:schemeClr>
+                        </a:solidFill>
+                      </a:endParaRPr>
+                    </a:p>
+                  </a:txBody>
+                  <a:tcPr anchor="ctr">
+                    <a:noFill/>
+                  </a:tcPr>
+                </a:tc>
+                <a:extLst>
+                  <a:ext uri="{0D108BD9-81ED-4DB2-BD59-A6C34878D82A}">
+                    <a16:rowId xmlns:a16="http://schemas.microsoft.com/office/drawing/2014/main" val="1800615351"/>
+                  </a:ext>
+                </a:extLst>
+              </a:tr>
+              <a:tr h="569708">
+                <a:tc>
+                  <a:txBody>
+                    <a:bodyPr/>
+                    <a:lstStyle/>
+                    <a:p>
+                      <a:pPr algn="ctr" latinLnBrk="1"/>
+                      <a:r>
+                        <a:rPr lang="en-US" altLang="ko-KR" sz="2400" dirty="0">
+                          <a:solidFill>
+                            <a:schemeClr val="bg1">
+                              <a:lumMod val="85000"/>
+                            </a:schemeClr>
+                          </a:solidFill>
+                        </a:rPr>
+                        <a:t>2</a:t>
+                      </a:r>
+                      <a:endParaRPr lang="ko-KR" altLang="en-US" sz="2400" dirty="0">
+                        <a:solidFill>
+                          <a:schemeClr val="bg1">
+                            <a:lumMod val="85000"/>
+                          </a:schemeClr>
+                        </a:solidFill>
+                      </a:endParaRPr>
+                    </a:p>
+                  </a:txBody>
+                  <a:tcPr anchor="ctr">
+                    <a:noFill/>
+                  </a:tcPr>
+                </a:tc>
+                <a:tc>
+                  <a:txBody>
+                    <a:bodyPr/>
+                    <a:lstStyle/>
+                    <a:p>
+                      <a:pPr algn="ctr" latinLnBrk="1"/>
+                      <a:endParaRPr lang="ko-KR" altLang="en-US" sz="2400">
+                        <a:solidFill>
+                          <a:schemeClr val="bg1">
+                            <a:lumMod val="85000"/>
+                          </a:schemeClr>
+                        </a:solidFill>
+                      </a:endParaRPr>
+                    </a:p>
+                  </a:txBody>
+                  <a:tcPr anchor="ctr">
+                    <a:noFill/>
+                  </a:tcPr>
+                </a:tc>
+                <a:tc>
+                  <a:txBody>
+                    <a:bodyPr/>
+                    <a:lstStyle/>
+                    <a:p>
+                      <a:pPr algn="ctr" latinLnBrk="1"/>
+                      <a:r>
+                        <a:rPr lang="en-US" altLang="ko-KR" sz="2400" dirty="0">
+                          <a:solidFill>
+                            <a:schemeClr val="bg1">
+                              <a:lumMod val="85000"/>
+                            </a:schemeClr>
+                          </a:solidFill>
+                        </a:rPr>
+                        <a:t>X</a:t>
+                      </a:r>
+                      <a:endParaRPr lang="ko-KR" altLang="en-US" sz="2400" dirty="0">
+                        <a:solidFill>
+                          <a:schemeClr val="bg1">
+                            <a:lumMod val="85000"/>
+                          </a:schemeClr>
+                        </a:solidFill>
+                      </a:endParaRPr>
+                    </a:p>
+                  </a:txBody>
+                  <a:tcPr anchor="ctr">
+                    <a:noFill/>
+                  </a:tcPr>
+                </a:tc>
+                <a:tc>
+                  <a:txBody>
+                    <a:bodyPr/>
+                    <a:lstStyle/>
+                    <a:p>
+                      <a:pPr algn="ctr" latinLnBrk="1"/>
+                      <a:endParaRPr lang="ko-KR" altLang="en-US" sz="2400" dirty="0">
+                        <a:solidFill>
+                          <a:schemeClr val="bg1">
+                            <a:lumMod val="85000"/>
+                          </a:schemeClr>
+                        </a:solidFill>
+                      </a:endParaRPr>
+                    </a:p>
+                  </a:txBody>
+                  <a:tcPr anchor="ctr">
+                    <a:noFill/>
+                  </a:tcPr>
+                </a:tc>
+                <a:tc>
+                  <a:txBody>
+                    <a:bodyPr/>
+                    <a:lstStyle/>
+                    <a:p>
+                      <a:pPr algn="ctr" latinLnBrk="1"/>
+                      <a:r>
+                        <a:rPr lang="en-US" altLang="ko-KR" sz="2400" dirty="0">
+                          <a:solidFill>
+                            <a:schemeClr val="bg1">
+                              <a:lumMod val="85000"/>
+                            </a:schemeClr>
+                          </a:solidFill>
+                        </a:rPr>
+                        <a:t>X</a:t>
+                      </a:r>
+                      <a:endParaRPr lang="ko-KR" altLang="en-US" sz="2400" dirty="0">
+                        <a:solidFill>
+                          <a:schemeClr val="bg1">
+                            <a:lumMod val="85000"/>
+                          </a:schemeClr>
+                        </a:solidFill>
+                      </a:endParaRPr>
+                    </a:p>
+                  </a:txBody>
+                  <a:tcPr anchor="ctr">
+                    <a:noFill/>
+                  </a:tcPr>
+                </a:tc>
+                <a:extLst>
+                  <a:ext uri="{0D108BD9-81ED-4DB2-BD59-A6C34878D82A}">
+                    <a16:rowId xmlns:a16="http://schemas.microsoft.com/office/drawing/2014/main" val="3198244239"/>
+                  </a:ext>
+                </a:extLst>
+              </a:tr>
+              <a:tr h="569708">
+                <a:tc>
+                  <a:txBody>
+                    <a:bodyPr/>
+                    <a:lstStyle/>
+                    <a:p>
+                      <a:pPr algn="ctr" latinLnBrk="1"/>
+                      <a:r>
+                        <a:rPr lang="en-US" altLang="ko-KR" sz="2400" dirty="0">
+                          <a:solidFill>
+                            <a:schemeClr val="bg1">
+                              <a:lumMod val="85000"/>
+                            </a:schemeClr>
+                          </a:solidFill>
+                        </a:rPr>
+                        <a:t>3</a:t>
+                      </a:r>
+                      <a:endParaRPr lang="ko-KR" altLang="en-US" sz="2400" dirty="0">
+                        <a:solidFill>
+                          <a:schemeClr val="bg1">
+                            <a:lumMod val="85000"/>
+                          </a:schemeClr>
+                        </a:solidFill>
+                      </a:endParaRPr>
+                    </a:p>
+                  </a:txBody>
+                  <a:tcPr anchor="ctr">
+                    <a:noFill/>
+                  </a:tcPr>
+                </a:tc>
+                <a:tc>
+                  <a:txBody>
+                    <a:bodyPr/>
+                    <a:lstStyle/>
+                    <a:p>
+                      <a:pPr algn="ctr" latinLnBrk="1"/>
+                      <a:endParaRPr lang="ko-KR" altLang="en-US" sz="2400">
+                        <a:solidFill>
+                          <a:schemeClr val="bg1">
+                            <a:lumMod val="85000"/>
+                          </a:schemeClr>
+                        </a:solidFill>
+                      </a:endParaRPr>
+                    </a:p>
+                  </a:txBody>
+                  <a:tcPr anchor="ctr">
+                    <a:noFill/>
+                  </a:tcPr>
+                </a:tc>
+                <a:tc>
+                  <a:txBody>
+                    <a:bodyPr/>
+                    <a:lstStyle/>
+                    <a:p>
+                      <a:pPr algn="ctr" latinLnBrk="1"/>
+                      <a:r>
+                        <a:rPr lang="en-US" altLang="ko-KR" sz="2400" dirty="0">
+                          <a:solidFill>
+                            <a:schemeClr val="bg1">
+                              <a:lumMod val="85000"/>
+                            </a:schemeClr>
+                          </a:solidFill>
+                        </a:rPr>
+                        <a:t>X</a:t>
+                      </a:r>
+                      <a:endParaRPr lang="ko-KR" altLang="en-US" sz="2400" dirty="0">
+                        <a:solidFill>
+                          <a:schemeClr val="bg1">
+                            <a:lumMod val="85000"/>
+                          </a:schemeClr>
+                        </a:solidFill>
+                      </a:endParaRPr>
+                    </a:p>
+                  </a:txBody>
+                  <a:tcPr anchor="ctr">
+                    <a:noFill/>
+                  </a:tcPr>
+                </a:tc>
+                <a:tc>
+                  <a:txBody>
+                    <a:bodyPr/>
+                    <a:lstStyle/>
+                    <a:p>
+                      <a:pPr algn="ctr" latinLnBrk="1"/>
+                      <a:r>
+                        <a:rPr lang="en-US" altLang="ko-KR" sz="2400" dirty="0">
+                          <a:solidFill>
+                            <a:schemeClr val="bg1">
+                              <a:lumMod val="85000"/>
+                            </a:schemeClr>
+                          </a:solidFill>
+                        </a:rPr>
+                        <a:t>E</a:t>
+                      </a:r>
+                      <a:endParaRPr lang="ko-KR" altLang="en-US" sz="2400" dirty="0">
+                        <a:solidFill>
+                          <a:schemeClr val="bg1">
+                            <a:lumMod val="85000"/>
+                          </a:schemeClr>
+                        </a:solidFill>
+                      </a:endParaRPr>
+                    </a:p>
+                  </a:txBody>
+                  <a:tcPr anchor="ctr">
+                    <a:noFill/>
+                  </a:tcPr>
+                </a:tc>
+                <a:tc>
+                  <a:txBody>
+                    <a:bodyPr/>
+                    <a:lstStyle/>
+                    <a:p>
+                      <a:pPr algn="ctr" latinLnBrk="1"/>
+                      <a:r>
+                        <a:rPr lang="en-US" altLang="ko-KR" sz="2400" dirty="0">
+                          <a:solidFill>
+                            <a:schemeClr val="bg1">
+                              <a:lumMod val="85000"/>
+                            </a:schemeClr>
+                          </a:solidFill>
+                        </a:rPr>
+                        <a:t>X</a:t>
+                      </a:r>
+                      <a:endParaRPr lang="ko-KR" altLang="en-US" sz="2400" dirty="0">
+                        <a:solidFill>
+                          <a:schemeClr val="bg1">
+                            <a:lumMod val="85000"/>
+                          </a:schemeClr>
+                        </a:solidFill>
+                      </a:endParaRPr>
+                    </a:p>
+                  </a:txBody>
+                  <a:tcPr anchor="ctr">
+                    <a:noFill/>
+                  </a:tcPr>
+                </a:tc>
+                <a:extLst>
+                  <a:ext uri="{0D108BD9-81ED-4DB2-BD59-A6C34878D82A}">
+                    <a16:rowId xmlns:a16="http://schemas.microsoft.com/office/drawing/2014/main" val="4208654686"/>
+                  </a:ext>
+                </a:extLst>
+              </a:tr>
+            </a:tbl>
+          </a:graphicData>
+        </a:graphic>
+      </p:graphicFrame>
+      <p:graphicFrame>
+        <p:nvGraphicFramePr>
+          <p:cNvPr id="8" name="표 7">
+            <a:extLst>
+              <a:ext uri="{FF2B5EF4-FFF2-40B4-BE49-F238E27FC236}">
+                <a16:creationId xmlns:a16="http://schemas.microsoft.com/office/drawing/2014/main" id="{56B5A83E-DF94-4B65-AF6F-6CB5B654711B}"/>
+              </a:ext>
+            </a:extLst>
+          </p:cNvPr>
+          <p:cNvGraphicFramePr>
+            <a:graphicFrameLocks noGrp="1"/>
+          </p:cNvGraphicFramePr>
+          <p:nvPr>
+            <p:extLst>
+              <p:ext uri="{D42A27DB-BD31-4B8C-83A1-F6EECF244321}">
+                <p14:modId xmlns:p14="http://schemas.microsoft.com/office/powerpoint/2010/main" val="1988356925"/>
+              </p:ext>
+            </p:extLst>
+          </p:nvPr>
+        </p:nvGraphicFramePr>
+        <p:xfrm>
+          <a:off x="6096000" y="1995439"/>
+          <a:ext cx="5937799" cy="1331844"/>
+        </p:xfrm>
+        <a:graphic>
+          <a:graphicData uri="http://schemas.openxmlformats.org/drawingml/2006/table">
+            <a:tbl>
+              <a:tblPr/>
+              <a:tblGrid>
+                <a:gridCol w="848257">
+                  <a:extLst>
+                    <a:ext uri="{9D8B030D-6E8A-4147-A177-3AD203B41FA5}">
+                      <a16:colId xmlns:a16="http://schemas.microsoft.com/office/drawing/2014/main" val="1326124428"/>
+                    </a:ext>
+                  </a:extLst>
+                </a:gridCol>
+                <a:gridCol w="848257">
+                  <a:extLst>
+                    <a:ext uri="{9D8B030D-6E8A-4147-A177-3AD203B41FA5}">
+                      <a16:colId xmlns:a16="http://schemas.microsoft.com/office/drawing/2014/main" val="463827987"/>
+                    </a:ext>
+                  </a:extLst>
+                </a:gridCol>
+                <a:gridCol w="848257">
+                  <a:extLst>
+                    <a:ext uri="{9D8B030D-6E8A-4147-A177-3AD203B41FA5}">
+                      <a16:colId xmlns:a16="http://schemas.microsoft.com/office/drawing/2014/main" val="3419744236"/>
+                    </a:ext>
+                  </a:extLst>
+                </a:gridCol>
+                <a:gridCol w="848257">
+                  <a:extLst>
+                    <a:ext uri="{9D8B030D-6E8A-4147-A177-3AD203B41FA5}">
+                      <a16:colId xmlns:a16="http://schemas.microsoft.com/office/drawing/2014/main" val="2512096992"/>
+                    </a:ext>
+                  </a:extLst>
+                </a:gridCol>
+                <a:gridCol w="848257">
+                  <a:extLst>
+                    <a:ext uri="{9D8B030D-6E8A-4147-A177-3AD203B41FA5}">
+                      <a16:colId xmlns:a16="http://schemas.microsoft.com/office/drawing/2014/main" val="4232852297"/>
+                    </a:ext>
+                  </a:extLst>
+                </a:gridCol>
+                <a:gridCol w="848257">
+                  <a:extLst>
+                    <a:ext uri="{9D8B030D-6E8A-4147-A177-3AD203B41FA5}">
+                      <a16:colId xmlns:a16="http://schemas.microsoft.com/office/drawing/2014/main" val="4079026458"/>
+                    </a:ext>
+                  </a:extLst>
+                </a:gridCol>
+                <a:gridCol w="848257">
+                  <a:extLst>
+                    <a:ext uri="{9D8B030D-6E8A-4147-A177-3AD203B41FA5}">
+                      <a16:colId xmlns:a16="http://schemas.microsoft.com/office/drawing/2014/main" val="2076626843"/>
+                    </a:ext>
+                  </a:extLst>
+                </a:gridCol>
+              </a:tblGrid>
+              <a:tr h="665922">
+                <a:tc>
+                  <a:txBody>
+                    <a:bodyPr/>
+                    <a:lstStyle/>
+                    <a:p>
+                      <a:pPr algn="ctr" latinLnBrk="1"/>
+                      <a:r>
+                        <a:rPr lang="en-US" altLang="ko-KR" sz="2400" dirty="0">
+                          <a:solidFill>
+                            <a:schemeClr val="bg1">
+                              <a:lumMod val="85000"/>
+                            </a:schemeClr>
+                          </a:solidFill>
+                        </a:rPr>
+                        <a:t>Y</a:t>
+                      </a:r>
+                      <a:endParaRPr lang="ko-KR" altLang="en-US" sz="2400" dirty="0">
+                        <a:solidFill>
+                          <a:schemeClr val="bg1">
+                            <a:lumMod val="85000"/>
+                          </a:schemeClr>
+                        </a:solidFill>
+                      </a:endParaRPr>
+                    </a:p>
+                  </a:txBody>
+                  <a:tcPr anchor="ctr">
+                    <a:lnL w="12700" cap="flat" cmpd="sng" algn="ctr">
+                      <a:noFill/>
+                      <a:prstDash val="solid"/>
+                      <a:round/>
+                      <a:headEnd type="none" w="med" len="med"/>
+                      <a:tailEnd type="none" w="med" len="med"/>
+                    </a:lnL>
+                    <a:lnR w="12700" cap="flat" cmpd="sng" algn="ctr">
+                      <a:noFill/>
+                      <a:prstDash val="solid"/>
+                      <a:round/>
+                      <a:headEnd type="none" w="med" len="med"/>
+                      <a:tailEnd type="none" w="med" len="med"/>
+                    </a:lnR>
+                    <a:lnT w="12700" cmpd="sng">
+                      <a:solidFill>
+                        <a:schemeClr val="bg1">
+                          <a:lumMod val="85000"/>
+                        </a:schemeClr>
+                      </a:solidFill>
+                      <a:prstDash val="solid"/>
+                    </a:lnT>
+                    <a:lnB w="12700" cap="flat" cmpd="sng" algn="ctr">
+                      <a:noFill/>
+                      <a:prstDash val="solid"/>
+                      <a:round/>
+                      <a:headEnd type="none" w="med" len="med"/>
+                      <a:tailEnd type="none" w="med" len="med"/>
+                    </a:lnB>
+                  </a:tcPr>
+                </a:tc>
+                <a:tc>
+                  <a:txBody>
+                    <a:bodyPr/>
+                    <a:lstStyle/>
+                    <a:p>
+                      <a:pPr algn="ctr" latinLnBrk="1"/>
+                      <a:r>
+                        <a:rPr lang="en-US" altLang="ko-KR" sz="2400" dirty="0">
+                          <a:solidFill>
+                            <a:schemeClr val="bg1">
+                              <a:lumMod val="85000"/>
+                            </a:schemeClr>
+                          </a:solidFill>
+                        </a:rPr>
+                        <a:t>0</a:t>
+                      </a:r>
+                      <a:endParaRPr lang="ko-KR" altLang="en-US" sz="2400" dirty="0">
+                        <a:solidFill>
+                          <a:schemeClr val="bg1">
+                            <a:lumMod val="85000"/>
+                          </a:schemeClr>
+                        </a:solidFill>
+                      </a:endParaRPr>
+                    </a:p>
+                  </a:txBody>
+                  <a:tcPr anchor="ctr">
+                    <a:lnL w="12700" cap="flat" cmpd="sng" algn="ctr">
+                      <a:noFill/>
+                      <a:prstDash val="solid"/>
+                      <a:round/>
+                      <a:headEnd type="none" w="med" len="med"/>
+                      <a:tailEnd type="none" w="med" len="med"/>
+                    </a:lnL>
+                    <a:lnR w="12700" cap="flat" cmpd="sng" algn="ctr">
+                      <a:noFill/>
+                      <a:prstDash val="solid"/>
+                      <a:round/>
+                      <a:headEnd type="none" w="med" len="med"/>
+                      <a:tailEnd type="none" w="med" len="med"/>
+                    </a:lnR>
+                    <a:lnT w="12700" cap="flat" cmpd="sng" algn="ctr">
+                      <a:solidFill>
+                        <a:schemeClr val="bg1">
+                          <a:lumMod val="85000"/>
+                        </a:schemeClr>
+                      </a:solidFill>
+                      <a:prstDash val="solid"/>
+                      <a:round/>
+                      <a:headEnd type="none" w="med" len="med"/>
+                      <a:tailEnd type="none" w="med" len="med"/>
+                    </a:lnT>
+                    <a:lnB w="12700" cap="flat" cmpd="sng" algn="ctr">
+                      <a:noFill/>
+                      <a:prstDash val="solid"/>
+                      <a:round/>
+                      <a:headEnd type="none" w="med" len="med"/>
+                      <a:tailEnd type="none" w="med" len="med"/>
+                    </a:lnB>
+                  </a:tcPr>
+                </a:tc>
+                <a:tc>
+                  <a:txBody>
+                    <a:bodyPr/>
+                    <a:lstStyle/>
+                    <a:p>
+                      <a:pPr algn="ctr" latinLnBrk="1"/>
+                      <a:endParaRPr lang="ko-KR" altLang="en-US" sz="2400" dirty="0">
+                        <a:solidFill>
+                          <a:schemeClr val="bg1">
+                            <a:lumMod val="85000"/>
+                          </a:schemeClr>
+                        </a:solidFill>
+                      </a:endParaRPr>
+                    </a:p>
+                  </a:txBody>
+                  <a:tcPr anchor="ctr">
+                    <a:lnL w="12700" cap="flat" cmpd="sng" algn="ctr">
+                      <a:noFill/>
+                      <a:prstDash val="solid"/>
+                      <a:round/>
+                      <a:headEnd type="none" w="med" len="med"/>
+                      <a:tailEnd type="none" w="med" len="med"/>
+                    </a:lnL>
+                    <a:lnR w="12700" cap="flat" cmpd="sng" algn="ctr">
+                      <a:noFill/>
+                      <a:prstDash val="solid"/>
+                      <a:round/>
+                      <a:headEnd type="none" w="med" len="med"/>
+                      <a:tailEnd type="none" w="med" len="med"/>
+                    </a:lnR>
+                    <a:lnT w="12700" cap="flat" cmpd="sng" algn="ctr">
+                      <a:solidFill>
+                        <a:schemeClr val="bg1">
+                          <a:lumMod val="85000"/>
+                        </a:schemeClr>
+                      </a:solidFill>
+                      <a:prstDash val="solid"/>
+                      <a:round/>
+                      <a:headEnd type="none" w="med" len="med"/>
+                      <a:tailEnd type="none" w="med" len="med"/>
+                    </a:lnT>
+                    <a:lnB w="12700" cap="flat" cmpd="sng" algn="ctr">
+                      <a:noFill/>
+                      <a:prstDash val="solid"/>
+                      <a:round/>
+                      <a:headEnd type="none" w="med" len="med"/>
+                      <a:tailEnd type="none" w="med" len="med"/>
+                    </a:lnB>
+                  </a:tcPr>
+                </a:tc>
+                <a:tc>
+                  <a:txBody>
+                    <a:bodyPr/>
+                    <a:lstStyle/>
+                    <a:p>
+                      <a:pPr algn="ctr" latinLnBrk="1"/>
+                      <a:endParaRPr lang="ko-KR" altLang="en-US" sz="2400" dirty="0">
+                        <a:solidFill>
+                          <a:schemeClr val="bg1">
+                            <a:lumMod val="85000"/>
+                          </a:schemeClr>
+                        </a:solidFill>
+                      </a:endParaRPr>
+                    </a:p>
+                  </a:txBody>
+                  <a:tcPr anchor="ctr">
+                    <a:lnL w="12700" cap="flat" cmpd="sng" algn="ctr">
+                      <a:noFill/>
+                      <a:prstDash val="solid"/>
+                      <a:round/>
+                      <a:headEnd type="none" w="med" len="med"/>
+                      <a:tailEnd type="none" w="med" len="med"/>
+                    </a:lnL>
+                    <a:lnR w="12700" cap="flat" cmpd="sng" algn="ctr">
+                      <a:noFill/>
+                      <a:prstDash val="solid"/>
+                      <a:round/>
+                      <a:headEnd type="none" w="med" len="med"/>
+                      <a:tailEnd type="none" w="med" len="med"/>
+                    </a:lnR>
+                    <a:lnT w="12700" cap="flat" cmpd="sng" algn="ctr">
+                      <a:solidFill>
+                        <a:schemeClr val="bg1">
+                          <a:lumMod val="85000"/>
+                        </a:schemeClr>
+                      </a:solidFill>
+                      <a:prstDash val="solid"/>
+                      <a:round/>
+                      <a:headEnd type="none" w="med" len="med"/>
+                      <a:tailEnd type="none" w="med" len="med"/>
+                    </a:lnT>
+                    <a:lnB w="12700" cap="flat" cmpd="sng" algn="ctr">
+                      <a:noFill/>
+                      <a:prstDash val="solid"/>
+                      <a:round/>
+                      <a:headEnd type="none" w="med" len="med"/>
+                      <a:tailEnd type="none" w="med" len="med"/>
+                    </a:lnB>
+                  </a:tcPr>
+                </a:tc>
+                <a:tc>
+                  <a:txBody>
+                    <a:bodyPr/>
+                    <a:lstStyle/>
+                    <a:p>
+                      <a:pPr algn="ctr" latinLnBrk="1"/>
+                      <a:endParaRPr lang="ko-KR" altLang="en-US" sz="2400" dirty="0">
+                        <a:solidFill>
+                          <a:schemeClr val="bg1">
+                            <a:lumMod val="85000"/>
+                          </a:schemeClr>
+                        </a:solidFill>
+                      </a:endParaRPr>
+                    </a:p>
+                  </a:txBody>
+                  <a:tcPr anchor="ctr">
+                    <a:lnL w="12700" cap="flat" cmpd="sng" algn="ctr">
+                      <a:noFill/>
+                      <a:prstDash val="solid"/>
+                      <a:round/>
+                      <a:headEnd type="none" w="med" len="med"/>
+                      <a:tailEnd type="none" w="med" len="med"/>
+                    </a:lnL>
+                    <a:lnR w="12700" cap="flat" cmpd="sng" algn="ctr">
+                      <a:noFill/>
+                      <a:prstDash val="solid"/>
+                      <a:round/>
+                      <a:headEnd type="none" w="med" len="med"/>
+                      <a:tailEnd type="none" w="med" len="med"/>
+                    </a:lnR>
+                    <a:lnT w="12700" cap="flat" cmpd="sng" algn="ctr">
+                      <a:solidFill>
+                        <a:schemeClr val="bg1">
+                          <a:lumMod val="85000"/>
+                        </a:schemeClr>
+                      </a:solidFill>
+                      <a:prstDash val="solid"/>
+                      <a:round/>
+                      <a:headEnd type="none" w="med" len="med"/>
+                      <a:tailEnd type="none" w="med" len="med"/>
+                    </a:lnT>
+                    <a:lnB w="12700" cap="flat" cmpd="sng" algn="ctr">
+                      <a:noFill/>
+                      <a:prstDash val="solid"/>
+                      <a:round/>
+                      <a:headEnd type="none" w="med" len="med"/>
+                      <a:tailEnd type="none" w="med" len="med"/>
+                    </a:lnB>
+                  </a:tcPr>
+                </a:tc>
+                <a:tc>
+                  <a:txBody>
+                    <a:bodyPr/>
+                    <a:lstStyle/>
+                    <a:p>
+                      <a:pPr algn="ctr" latinLnBrk="1"/>
+                      <a:endParaRPr lang="ko-KR" altLang="en-US" sz="2400" dirty="0">
+                        <a:solidFill>
+                          <a:schemeClr val="bg1">
+                            <a:lumMod val="85000"/>
+                          </a:schemeClr>
+                        </a:solidFill>
+                      </a:endParaRPr>
+                    </a:p>
+                  </a:txBody>
+                  <a:tcPr anchor="ctr">
+                    <a:lnL w="12700" cap="flat" cmpd="sng" algn="ctr">
+                      <a:noFill/>
+                      <a:prstDash val="solid"/>
+                      <a:round/>
+                      <a:headEnd type="none" w="med" len="med"/>
+                      <a:tailEnd type="none" w="med" len="med"/>
+                    </a:lnL>
+                    <a:lnR w="12700" cap="flat" cmpd="sng" algn="ctr">
+                      <a:noFill/>
+                      <a:prstDash val="solid"/>
+                      <a:round/>
+                      <a:headEnd type="none" w="med" len="med"/>
+                      <a:tailEnd type="none" w="med" len="med"/>
+                    </a:lnR>
+                    <a:lnT w="12700" cap="flat" cmpd="sng" algn="ctr">
+                      <a:solidFill>
+                        <a:schemeClr val="bg1">
+                          <a:lumMod val="85000"/>
+                        </a:schemeClr>
+                      </a:solidFill>
+                      <a:prstDash val="solid"/>
+                      <a:round/>
+                      <a:headEnd type="none" w="med" len="med"/>
+                      <a:tailEnd type="none" w="med" len="med"/>
+                    </a:lnT>
+                    <a:lnB w="12700" cap="flat" cmpd="sng" algn="ctr">
+                      <a:noFill/>
+                      <a:prstDash val="solid"/>
+                      <a:round/>
+                      <a:headEnd type="none" w="med" len="med"/>
+                      <a:tailEnd type="none" w="med" len="med"/>
+                    </a:lnB>
+                  </a:tcPr>
+                </a:tc>
+                <a:tc>
+                  <a:txBody>
+                    <a:bodyPr/>
+                    <a:lstStyle/>
+                    <a:p>
+                      <a:pPr algn="ctr" latinLnBrk="1"/>
+                      <a:endParaRPr lang="ko-KR" altLang="en-US" sz="2400" dirty="0">
+                        <a:solidFill>
+                          <a:schemeClr val="bg1">
+                            <a:lumMod val="85000"/>
+                          </a:schemeClr>
+                        </a:solidFill>
+                      </a:endParaRPr>
+                    </a:p>
+                  </a:txBody>
+                  <a:tcPr anchor="ctr">
+                    <a:lnL w="12700" cap="flat" cmpd="sng" algn="ctr">
+                      <a:noFill/>
+                      <a:prstDash val="solid"/>
+                      <a:round/>
+                      <a:headEnd type="none" w="med" len="med"/>
+                      <a:tailEnd type="none" w="med" len="med"/>
+                    </a:lnL>
+                    <a:lnR w="12700" cap="flat" cmpd="sng" algn="ctr">
+                      <a:noFill/>
+                      <a:prstDash val="solid"/>
+                      <a:round/>
+                      <a:headEnd type="none" w="med" len="med"/>
+                      <a:tailEnd type="none" w="med" len="med"/>
+                    </a:lnR>
+                    <a:lnT w="12700" cap="flat" cmpd="sng" algn="ctr">
+                      <a:solidFill>
+                        <a:schemeClr val="bg1">
+                          <a:lumMod val="85000"/>
+                        </a:schemeClr>
+                      </a:solidFill>
+                      <a:prstDash val="solid"/>
+                      <a:round/>
+                      <a:headEnd type="none" w="med" len="med"/>
+                      <a:tailEnd type="none" w="med" len="med"/>
+                    </a:lnT>
+                    <a:lnB w="12700" cap="flat" cmpd="sng" algn="ctr">
+                      <a:noFill/>
+                      <a:prstDash val="solid"/>
+                      <a:round/>
+                      <a:headEnd type="none" w="med" len="med"/>
+                      <a:tailEnd type="none" w="med" len="med"/>
+                    </a:lnB>
+                  </a:tcPr>
+                </a:tc>
+                <a:extLst>
+                  <a:ext uri="{0D108BD9-81ED-4DB2-BD59-A6C34878D82A}">
+                    <a16:rowId xmlns:a16="http://schemas.microsoft.com/office/drawing/2014/main" val="1812318293"/>
+                  </a:ext>
+                </a:extLst>
+              </a:tr>
+              <a:tr h="665922">
+                <a:tc>
+                  <a:txBody>
+                    <a:bodyPr/>
+                    <a:lstStyle/>
+                    <a:p>
+                      <a:pPr algn="ctr" latinLnBrk="1"/>
+                      <a:r>
+                        <a:rPr lang="en-US" altLang="ko-KR" sz="2400" dirty="0">
+                          <a:solidFill>
+                            <a:schemeClr val="bg1">
+                              <a:lumMod val="85000"/>
+                            </a:schemeClr>
+                          </a:solidFill>
+                        </a:rPr>
+                        <a:t>X</a:t>
+                      </a:r>
+                      <a:endParaRPr lang="ko-KR" altLang="en-US" sz="2400" dirty="0">
+                        <a:solidFill>
+                          <a:schemeClr val="bg1">
+                            <a:lumMod val="85000"/>
+                          </a:schemeClr>
+                        </a:solidFill>
+                      </a:endParaRPr>
+                    </a:p>
+                  </a:txBody>
+                  <a:tcPr anchor="ctr">
+                    <a:lnL w="12700" cap="flat" cmpd="sng" algn="ctr">
+                      <a:noFill/>
+                      <a:prstDash val="solid"/>
+                      <a:round/>
+                      <a:headEnd type="none" w="med" len="med"/>
+                      <a:tailEnd type="none" w="med" len="med"/>
+                    </a:lnL>
+                    <a:lnR w="12700" cap="flat" cmpd="sng" algn="ctr">
+                      <a:noFill/>
+                      <a:prstDash val="solid"/>
+                      <a:round/>
+                      <a:headEnd type="none" w="med" len="med"/>
+                      <a:tailEnd type="none" w="med" len="med"/>
+                    </a:lnR>
+                    <a:lnT w="12700" cap="flat" cmpd="sng" algn="ctr">
+                      <a:noFill/>
+                      <a:prstDash val="solid"/>
+                      <a:round/>
+                      <a:headEnd type="none" w="med" len="med"/>
+                      <a:tailEnd type="none" w="med" len="med"/>
+                    </a:lnT>
+                    <a:lnB w="12700" cmpd="sng">
+                      <a:solidFill>
+                        <a:schemeClr val="bg1">
+                          <a:lumMod val="85000"/>
+                        </a:schemeClr>
+                      </a:solidFill>
+                      <a:prstDash val="solid"/>
+                    </a:lnB>
+                  </a:tcPr>
+                </a:tc>
+                <a:tc>
+                  <a:txBody>
+                    <a:bodyPr/>
+                    <a:lstStyle/>
+                    <a:p>
+                      <a:pPr algn="ctr" latinLnBrk="1"/>
+                      <a:r>
+                        <a:rPr lang="en-US" altLang="ko-KR" sz="2400" dirty="0">
+                          <a:solidFill>
+                            <a:schemeClr val="bg1">
+                              <a:lumMod val="85000"/>
+                            </a:schemeClr>
+                          </a:solidFill>
+                        </a:rPr>
+                        <a:t>0</a:t>
+                      </a:r>
+                      <a:endParaRPr lang="ko-KR" altLang="en-US" sz="2400" dirty="0">
+                        <a:solidFill>
+                          <a:schemeClr val="bg1">
+                            <a:lumMod val="85000"/>
+                          </a:schemeClr>
+                        </a:solidFill>
+                      </a:endParaRPr>
+                    </a:p>
+                  </a:txBody>
+                  <a:tcPr anchor="ctr">
+                    <a:lnL w="12700" cap="flat" cmpd="sng" algn="ctr">
+                      <a:noFill/>
+                      <a:prstDash val="solid"/>
+                      <a:round/>
+                      <a:headEnd type="none" w="med" len="med"/>
+                      <a:tailEnd type="none" w="med" len="med"/>
+                    </a:lnL>
+                    <a:lnR w="12700" cap="flat" cmpd="sng" algn="ctr">
+                      <a:noFill/>
+                      <a:prstDash val="solid"/>
+                      <a:round/>
+                      <a:headEnd type="none" w="med" len="med"/>
+                      <a:tailEnd type="none" w="med" len="med"/>
+                    </a:lnR>
+                    <a:lnT w="12700" cap="flat" cmpd="sng" algn="ctr">
+                      <a:noFill/>
+                      <a:prstDash val="solid"/>
+                      <a:round/>
+                      <a:headEnd type="none" w="med" len="med"/>
+                      <a:tailEnd type="none" w="med" len="med"/>
+                    </a:lnT>
+                    <a:lnB w="12700" cap="flat" cmpd="sng" algn="ctr">
+                      <a:solidFill>
+                        <a:schemeClr val="bg1">
+                          <a:lumMod val="85000"/>
+                        </a:schemeClr>
+                      </a:solidFill>
+                      <a:prstDash val="solid"/>
+                      <a:round/>
+                      <a:headEnd type="none" w="med" len="med"/>
+                      <a:tailEnd type="none" w="med" len="med"/>
+                    </a:lnB>
+                  </a:tcPr>
+                </a:tc>
+                <a:tc>
+                  <a:txBody>
+                    <a:bodyPr/>
+                    <a:lstStyle/>
+                    <a:p>
+                      <a:pPr algn="ctr" latinLnBrk="1"/>
+                      <a:endParaRPr lang="ko-KR" altLang="en-US" sz="2400" dirty="0">
+                        <a:solidFill>
+                          <a:schemeClr val="bg1">
+                            <a:lumMod val="85000"/>
+                          </a:schemeClr>
+                        </a:solidFill>
+                      </a:endParaRPr>
+                    </a:p>
+                  </a:txBody>
+                  <a:tcPr anchor="ctr">
+                    <a:lnL w="12700" cap="flat" cmpd="sng" algn="ctr">
+                      <a:noFill/>
+                      <a:prstDash val="solid"/>
+                      <a:round/>
+                      <a:headEnd type="none" w="med" len="med"/>
+                      <a:tailEnd type="none" w="med" len="med"/>
+                    </a:lnL>
+                    <a:lnR w="12700" cap="flat" cmpd="sng" algn="ctr">
+                      <a:noFill/>
+                      <a:prstDash val="solid"/>
+                      <a:round/>
+                      <a:headEnd type="none" w="med" len="med"/>
+                      <a:tailEnd type="none" w="med" len="med"/>
+                    </a:lnR>
+                    <a:lnT w="12700" cap="flat" cmpd="sng" algn="ctr">
+                      <a:noFill/>
+                      <a:prstDash val="solid"/>
+                      <a:round/>
+                      <a:headEnd type="none" w="med" len="med"/>
+                      <a:tailEnd type="none" w="med" len="med"/>
+                    </a:lnT>
+                    <a:lnB w="12700" cap="flat" cmpd="sng" algn="ctr">
+                      <a:solidFill>
+                        <a:schemeClr val="bg1">
+                          <a:lumMod val="85000"/>
+                        </a:schemeClr>
+                      </a:solidFill>
+                      <a:prstDash val="solid"/>
+                      <a:round/>
+                      <a:headEnd type="none" w="med" len="med"/>
+                      <a:tailEnd type="none" w="med" len="med"/>
+                    </a:lnB>
+                  </a:tcPr>
+                </a:tc>
+                <a:tc>
+                  <a:txBody>
+                    <a:bodyPr/>
+                    <a:lstStyle/>
+                    <a:p>
+                      <a:pPr algn="ctr" latinLnBrk="1"/>
+                      <a:endParaRPr lang="ko-KR" altLang="en-US" sz="2400" dirty="0">
+                        <a:solidFill>
+                          <a:schemeClr val="bg1">
+                            <a:lumMod val="85000"/>
+                          </a:schemeClr>
+                        </a:solidFill>
+                      </a:endParaRPr>
+                    </a:p>
+                  </a:txBody>
+                  <a:tcPr anchor="ctr">
+                    <a:lnL w="12700" cap="flat" cmpd="sng" algn="ctr">
+                      <a:noFill/>
+                      <a:prstDash val="solid"/>
+                      <a:round/>
+                      <a:headEnd type="none" w="med" len="med"/>
+                      <a:tailEnd type="none" w="med" len="med"/>
+                    </a:lnL>
+                    <a:lnR w="12700" cap="flat" cmpd="sng" algn="ctr">
+                      <a:noFill/>
+                      <a:prstDash val="solid"/>
+                      <a:round/>
+                      <a:headEnd type="none" w="med" len="med"/>
+                      <a:tailEnd type="none" w="med" len="med"/>
+                    </a:lnR>
+                    <a:lnT w="12700" cap="flat" cmpd="sng" algn="ctr">
+                      <a:noFill/>
+                      <a:prstDash val="solid"/>
+                      <a:round/>
+                      <a:headEnd type="none" w="med" len="med"/>
+                      <a:tailEnd type="none" w="med" len="med"/>
+                    </a:lnT>
+                    <a:lnB w="12700" cap="flat" cmpd="sng" algn="ctr">
+                      <a:solidFill>
+                        <a:schemeClr val="bg1">
+                          <a:lumMod val="85000"/>
+                        </a:schemeClr>
+                      </a:solidFill>
+                      <a:prstDash val="solid"/>
+                      <a:round/>
+                      <a:headEnd type="none" w="med" len="med"/>
+                      <a:tailEnd type="none" w="med" len="med"/>
+                    </a:lnB>
+                  </a:tcPr>
+                </a:tc>
+                <a:tc>
+                  <a:txBody>
+                    <a:bodyPr/>
+                    <a:lstStyle/>
+                    <a:p>
+                      <a:pPr algn="ctr" latinLnBrk="1"/>
+                      <a:endParaRPr lang="ko-KR" altLang="en-US" sz="2400" dirty="0">
+                        <a:solidFill>
+                          <a:schemeClr val="bg1">
+                            <a:lumMod val="85000"/>
+                          </a:schemeClr>
+                        </a:solidFill>
+                      </a:endParaRPr>
+                    </a:p>
+                  </a:txBody>
+                  <a:tcPr anchor="ctr">
+                    <a:lnL w="12700" cap="flat" cmpd="sng" algn="ctr">
+                      <a:noFill/>
+                      <a:prstDash val="solid"/>
+                      <a:round/>
+                      <a:headEnd type="none" w="med" len="med"/>
+                      <a:tailEnd type="none" w="med" len="med"/>
+                    </a:lnL>
+                    <a:lnR w="12700" cap="flat" cmpd="sng" algn="ctr">
+                      <a:noFill/>
+                      <a:prstDash val="solid"/>
+                      <a:round/>
+                      <a:headEnd type="none" w="med" len="med"/>
+                      <a:tailEnd type="none" w="med" len="med"/>
+                    </a:lnR>
+                    <a:lnT w="12700" cap="flat" cmpd="sng" algn="ctr">
+                      <a:noFill/>
+                      <a:prstDash val="solid"/>
+                      <a:round/>
+                      <a:headEnd type="none" w="med" len="med"/>
+                      <a:tailEnd type="none" w="med" len="med"/>
+                    </a:lnT>
+                    <a:lnB w="12700" cap="flat" cmpd="sng" algn="ctr">
+                      <a:solidFill>
+                        <a:schemeClr val="bg1">
+                          <a:lumMod val="85000"/>
+                        </a:schemeClr>
+                      </a:solidFill>
+                      <a:prstDash val="solid"/>
+                      <a:round/>
+                      <a:headEnd type="none" w="med" len="med"/>
+                      <a:tailEnd type="none" w="med" len="med"/>
+                    </a:lnB>
+                  </a:tcPr>
+                </a:tc>
+                <a:tc>
+                  <a:txBody>
+                    <a:bodyPr/>
+                    <a:lstStyle/>
+                    <a:p>
+                      <a:pPr algn="ctr" latinLnBrk="1"/>
+                      <a:endParaRPr lang="ko-KR" altLang="en-US" sz="2400" dirty="0">
+                        <a:solidFill>
+                          <a:schemeClr val="bg1">
+                            <a:lumMod val="85000"/>
+                          </a:schemeClr>
+                        </a:solidFill>
+                      </a:endParaRPr>
+                    </a:p>
+                  </a:txBody>
+                  <a:tcPr anchor="ctr">
+                    <a:lnL w="12700" cap="flat" cmpd="sng" algn="ctr">
+                      <a:noFill/>
+                      <a:prstDash val="solid"/>
+                      <a:round/>
+                      <a:headEnd type="none" w="med" len="med"/>
+                      <a:tailEnd type="none" w="med" len="med"/>
+                    </a:lnL>
+                    <a:lnR w="12700" cap="flat" cmpd="sng" algn="ctr">
+                      <a:noFill/>
+                      <a:prstDash val="solid"/>
+                      <a:round/>
+                      <a:headEnd type="none" w="med" len="med"/>
+                      <a:tailEnd type="none" w="med" len="med"/>
+                    </a:lnR>
+                    <a:lnT w="12700" cap="flat" cmpd="sng" algn="ctr">
+                      <a:noFill/>
+                      <a:prstDash val="solid"/>
+                      <a:round/>
+                      <a:headEnd type="none" w="med" len="med"/>
+                      <a:tailEnd type="none" w="med" len="med"/>
+                    </a:lnT>
+                    <a:lnB w="12700" cap="flat" cmpd="sng" algn="ctr">
+                      <a:solidFill>
+                        <a:schemeClr val="bg1">
+                          <a:lumMod val="85000"/>
+                        </a:schemeClr>
+                      </a:solidFill>
+                      <a:prstDash val="solid"/>
+                      <a:round/>
+                      <a:headEnd type="none" w="med" len="med"/>
+                      <a:tailEnd type="none" w="med" len="med"/>
+                    </a:lnB>
+                  </a:tcPr>
+                </a:tc>
+                <a:tc>
+                  <a:txBody>
+                    <a:bodyPr/>
+                    <a:lstStyle/>
+                    <a:p>
+                      <a:pPr algn="ctr" latinLnBrk="1"/>
+                      <a:endParaRPr lang="ko-KR" altLang="en-US" sz="2400" dirty="0">
+                        <a:solidFill>
+                          <a:schemeClr val="bg1">
+                            <a:lumMod val="85000"/>
+                          </a:schemeClr>
+                        </a:solidFill>
+                      </a:endParaRPr>
+                    </a:p>
+                  </a:txBody>
+                  <a:tcPr anchor="ctr">
+                    <a:lnL w="12700" cap="flat" cmpd="sng" algn="ctr">
+                      <a:noFill/>
+                      <a:prstDash val="solid"/>
+                      <a:round/>
+                      <a:headEnd type="none" w="med" len="med"/>
+                      <a:tailEnd type="none" w="med" len="med"/>
+                    </a:lnL>
+                    <a:lnR w="12700" cap="flat" cmpd="sng" algn="ctr">
+                      <a:noFill/>
+                      <a:prstDash val="solid"/>
+                      <a:round/>
+                      <a:headEnd type="none" w="med" len="med"/>
+                      <a:tailEnd type="none" w="med" len="med"/>
+                    </a:lnR>
+                    <a:lnT w="12700" cap="flat" cmpd="sng" algn="ctr">
+                      <a:noFill/>
+                      <a:prstDash val="solid"/>
+                      <a:round/>
+                      <a:headEnd type="none" w="med" len="med"/>
+                      <a:tailEnd type="none" w="med" len="med"/>
+                    </a:lnT>
+                    <a:lnB w="12700" cap="flat" cmpd="sng" algn="ctr">
+                      <a:solidFill>
+                        <a:schemeClr val="bg1">
+                          <a:lumMod val="85000"/>
+                        </a:schemeClr>
+                      </a:solidFill>
+                      <a:prstDash val="solid"/>
+                      <a:round/>
+                      <a:headEnd type="none" w="med" len="med"/>
+                      <a:tailEnd type="none" w="med" len="med"/>
+                    </a:lnB>
+                  </a:tcPr>
+                </a:tc>
+                <a:extLst>
+                  <a:ext uri="{0D108BD9-81ED-4DB2-BD59-A6C34878D82A}">
+                    <a16:rowId xmlns:a16="http://schemas.microsoft.com/office/drawing/2014/main" val="2193693611"/>
+                  </a:ext>
+                </a:extLst>
+              </a:tr>
+            </a:tbl>
+          </a:graphicData>
+        </a:graphic>
+      </p:graphicFrame>
+      <p:sp>
+        <p:nvSpPr>
+          <p:cNvPr id="9" name="TextBox 8">
+            <a:extLst>
+              <a:ext uri="{FF2B5EF4-FFF2-40B4-BE49-F238E27FC236}">
+                <a16:creationId xmlns:a16="http://schemas.microsoft.com/office/drawing/2014/main" id="{DC1B20BF-073D-4B20-98E3-481156AEAF51}"/>
+              </a:ext>
+            </a:extLst>
+          </p:cNvPr>
+          <p:cNvSpPr txBox="1"/>
+          <p:nvPr/>
+        </p:nvSpPr>
+        <p:spPr>
+          <a:xfrm>
+            <a:off x="981879" y="4494700"/>
+            <a:ext cx="10155756" cy="461665"/>
+          </a:xfrm>
+          <a:prstGeom prst="rect">
+            <a:avLst/>
+          </a:prstGeom>
+          <a:noFill/>
+        </p:spPr>
+        <p:txBody>
+          <a:bodyPr wrap="square" rtlCol="0">
+            <a:spAutoFit/>
+          </a:bodyPr>
+          <a:lstStyle/>
+          <a:p>
+            <a:pPr marL="342900" indent="-342900">
+              <a:buFont typeface="Arial" panose="020B0604020202020204" pitchFamily="34" charset="0"/>
+              <a:buChar char="•"/>
+            </a:pPr>
+            <a:r>
+              <a:rPr lang="ko-KR" altLang="en-US" sz="2400" dirty="0">
+                <a:solidFill>
+                  <a:schemeClr val="bg1">
+                    <a:lumMod val="95000"/>
+                  </a:schemeClr>
+                </a:solidFill>
+              </a:rPr>
+              <a:t>첫 스타트 포인트</a:t>
+            </a:r>
+            <a:r>
+              <a:rPr lang="en-US" altLang="ko-KR" sz="2400" dirty="0">
+                <a:solidFill>
+                  <a:schemeClr val="bg1">
+                    <a:lumMod val="95000"/>
+                  </a:schemeClr>
+                </a:solidFill>
+              </a:rPr>
+              <a:t>(S)</a:t>
+            </a:r>
+            <a:r>
+              <a:rPr lang="ko-KR" altLang="en-US" sz="2400" dirty="0">
+                <a:solidFill>
+                  <a:schemeClr val="bg1">
+                    <a:lumMod val="95000"/>
+                  </a:schemeClr>
+                </a:solidFill>
+              </a:rPr>
+              <a:t>를 </a:t>
+            </a:r>
+            <a:r>
+              <a:rPr lang="en-US" altLang="ko-KR" sz="2400" dirty="0">
+                <a:solidFill>
+                  <a:schemeClr val="bg1">
+                    <a:lumMod val="95000"/>
+                  </a:schemeClr>
+                </a:solidFill>
+              </a:rPr>
+              <a:t>0, 0</a:t>
+            </a:r>
+            <a:r>
+              <a:rPr lang="ko-KR" altLang="en-US" sz="2400" dirty="0">
+                <a:solidFill>
+                  <a:schemeClr val="bg1">
+                    <a:lumMod val="95000"/>
+                  </a:schemeClr>
+                </a:solidFill>
+              </a:rPr>
+              <a:t>에서 시작</a:t>
+            </a:r>
+            <a:r>
+              <a:rPr lang="en-US" altLang="ko-KR" sz="2400" dirty="0">
+                <a:solidFill>
+                  <a:schemeClr val="bg1">
+                    <a:lumMod val="95000"/>
+                  </a:schemeClr>
+                </a:solidFill>
+              </a:rPr>
+              <a:t>.</a:t>
+            </a:r>
+          </a:p>
+        </p:txBody>
+      </p:sp>
+      <p:sp>
+        <p:nvSpPr>
+          <p:cNvPr id="10" name="TextBox 9">
+            <a:extLst>
+              <a:ext uri="{FF2B5EF4-FFF2-40B4-BE49-F238E27FC236}">
+                <a16:creationId xmlns:a16="http://schemas.microsoft.com/office/drawing/2014/main" id="{DBAC677F-A9C2-4E8D-BE66-B064004C4BFB}"/>
+              </a:ext>
+            </a:extLst>
+          </p:cNvPr>
+          <p:cNvSpPr txBox="1"/>
+          <p:nvPr/>
+        </p:nvSpPr>
+        <p:spPr>
+          <a:xfrm>
+            <a:off x="8314461" y="1395660"/>
+            <a:ext cx="1704183" cy="461665"/>
+          </a:xfrm>
+          <a:prstGeom prst="rect">
+            <a:avLst/>
+          </a:prstGeom>
+          <a:noFill/>
+        </p:spPr>
+        <p:txBody>
+          <a:bodyPr wrap="square" rtlCol="0">
+            <a:spAutoFit/>
+          </a:bodyPr>
+          <a:lstStyle/>
+          <a:p>
+            <a:pPr marL="342900" indent="-342900">
+              <a:buFont typeface="Arial" panose="020B0604020202020204" pitchFamily="34" charset="0"/>
+              <a:buChar char="•"/>
+            </a:pPr>
+            <a:r>
+              <a:rPr lang="en-US" altLang="ko-KR" sz="2400" dirty="0">
+                <a:solidFill>
+                  <a:schemeClr val="bg1">
+                    <a:lumMod val="95000"/>
+                  </a:schemeClr>
+                </a:solidFill>
+              </a:rPr>
+              <a:t>Queue</a:t>
+            </a:r>
+            <a:endParaRPr lang="ko-KR" altLang="en-US" sz="2400" dirty="0">
+              <a:solidFill>
+                <a:schemeClr val="bg1">
+                  <a:lumMod val="95000"/>
+                </a:schemeClr>
+              </a:solidFill>
+            </a:endParaRPr>
+          </a:p>
+        </p:txBody>
+      </p:sp>
+      <p:sp>
+        <p:nvSpPr>
+          <p:cNvPr id="11" name="TextBox 10">
+            <a:extLst>
+              <a:ext uri="{FF2B5EF4-FFF2-40B4-BE49-F238E27FC236}">
+                <a16:creationId xmlns:a16="http://schemas.microsoft.com/office/drawing/2014/main" id="{FDB93A58-4B6C-4D20-A91A-B268BDB25892}"/>
+              </a:ext>
+            </a:extLst>
+          </p:cNvPr>
+          <p:cNvSpPr txBox="1"/>
+          <p:nvPr/>
+        </p:nvSpPr>
+        <p:spPr>
+          <a:xfrm>
+            <a:off x="2533105" y="897596"/>
+            <a:ext cx="1704183" cy="461665"/>
+          </a:xfrm>
+          <a:prstGeom prst="rect">
+            <a:avLst/>
+          </a:prstGeom>
+          <a:noFill/>
+        </p:spPr>
+        <p:txBody>
+          <a:bodyPr wrap="square" rtlCol="0">
+            <a:spAutoFit/>
+          </a:bodyPr>
+          <a:lstStyle/>
+          <a:p>
+            <a:pPr marL="342900" indent="-342900">
+              <a:buFont typeface="Arial" panose="020B0604020202020204" pitchFamily="34" charset="0"/>
+              <a:buChar char="•"/>
+            </a:pPr>
+            <a:r>
+              <a:rPr lang="en-US" altLang="ko-KR" sz="2400" dirty="0">
+                <a:solidFill>
+                  <a:schemeClr val="bg1">
+                    <a:lumMod val="95000"/>
+                  </a:schemeClr>
+                </a:solidFill>
+              </a:rPr>
+              <a:t>Board</a:t>
+            </a:r>
+            <a:endParaRPr lang="ko-KR" altLang="en-US" sz="2400" dirty="0">
+              <a:solidFill>
+                <a:schemeClr val="bg1">
+                  <a:lumMod val="95000"/>
+                </a:schemeClr>
+              </a:solidFill>
+            </a:endParaRPr>
+          </a:p>
+        </p:txBody>
+      </p:sp>
+    </p:spTree>
+    <p:extLst>
+      <p:ext uri="{BB962C8B-B14F-4D97-AF65-F5344CB8AC3E}">
+        <p14:creationId xmlns:p14="http://schemas.microsoft.com/office/powerpoint/2010/main" val="4002610447"/>
+      </p:ext>
+    </p:extLst>
+  </p:cSld>
+  <p:clrMapOvr>
+    <a:masterClrMapping/>
+  </p:clrMapOvr>
+</p:sld>
+</file>
+
+<file path=ppt/slides/slide4.xml><?xml version="1.0" encoding="utf-8"?>
 <p:sld xmlns:a="http://schemas.openxmlformats.org/drawingml/2006/main" xmlns:r="http://schemas.openxmlformats.org/officeDocument/2006/relationships" xmlns:p="http://schemas.openxmlformats.org/presentationml/2006/main">
   <p:cSld>
     <p:bg>
@@ -5760,6 +9341,527 @@
           </a:p>
         </p:txBody>
       </p:sp>
+      <p:graphicFrame>
+        <p:nvGraphicFramePr>
+          <p:cNvPr id="10" name="표 4">
+            <a:extLst>
+              <a:ext uri="{FF2B5EF4-FFF2-40B4-BE49-F238E27FC236}">
+                <a16:creationId xmlns:a16="http://schemas.microsoft.com/office/drawing/2014/main" id="{89799C5A-4EC5-4588-9885-84C2E8A04658}"/>
+              </a:ext>
+            </a:extLst>
+          </p:cNvPr>
+          <p:cNvGraphicFramePr>
+            <a:graphicFrameLocks noGrp="1"/>
+          </p:cNvGraphicFramePr>
+          <p:nvPr>
+            <p:extLst>
+              <p:ext uri="{D42A27DB-BD31-4B8C-83A1-F6EECF244321}">
+                <p14:modId xmlns:p14="http://schemas.microsoft.com/office/powerpoint/2010/main" val="1525992629"/>
+              </p:ext>
+            </p:extLst>
+          </p:nvPr>
+        </p:nvGraphicFramePr>
+        <p:xfrm>
+          <a:off x="1917399" y="1290885"/>
+          <a:ext cx="4707246" cy="2848540"/>
+        </p:xfrm>
+        <a:graphic>
+          <a:graphicData uri="http://schemas.openxmlformats.org/drawingml/2006/table">
+            <a:tbl>
+              <a:tblPr firstRow="1" bandRow="1">
+                <a:tableStyleId>{5C22544A-7EE6-4342-B048-85BDC9FD1C3A}</a:tableStyleId>
+              </a:tblPr>
+              <a:tblGrid>
+                <a:gridCol w="570674">
+                  <a:extLst>
+                    <a:ext uri="{9D8B030D-6E8A-4147-A177-3AD203B41FA5}">
+                      <a16:colId xmlns:a16="http://schemas.microsoft.com/office/drawing/2014/main" val="3490214599"/>
+                    </a:ext>
+                  </a:extLst>
+                </a:gridCol>
+                <a:gridCol w="1034143">
+                  <a:extLst>
+                    <a:ext uri="{9D8B030D-6E8A-4147-A177-3AD203B41FA5}">
+                      <a16:colId xmlns:a16="http://schemas.microsoft.com/office/drawing/2014/main" val="916022807"/>
+                    </a:ext>
+                  </a:extLst>
+                </a:gridCol>
+                <a:gridCol w="1034143">
+                  <a:extLst>
+                    <a:ext uri="{9D8B030D-6E8A-4147-A177-3AD203B41FA5}">
+                      <a16:colId xmlns:a16="http://schemas.microsoft.com/office/drawing/2014/main" val="1536341254"/>
+                    </a:ext>
+                  </a:extLst>
+                </a:gridCol>
+                <a:gridCol w="1034143">
+                  <a:extLst>
+                    <a:ext uri="{9D8B030D-6E8A-4147-A177-3AD203B41FA5}">
+                      <a16:colId xmlns:a16="http://schemas.microsoft.com/office/drawing/2014/main" val="3024976023"/>
+                    </a:ext>
+                  </a:extLst>
+                </a:gridCol>
+                <a:gridCol w="1034143">
+                  <a:extLst>
+                    <a:ext uri="{9D8B030D-6E8A-4147-A177-3AD203B41FA5}">
+                      <a16:colId xmlns:a16="http://schemas.microsoft.com/office/drawing/2014/main" val="2210718781"/>
+                    </a:ext>
+                  </a:extLst>
+                </a:gridCol>
+              </a:tblGrid>
+              <a:tr h="569708">
+                <a:tc>
+                  <a:txBody>
+                    <a:bodyPr/>
+                    <a:lstStyle/>
+                    <a:p>
+                      <a:pPr latinLnBrk="1"/>
+                      <a:endParaRPr lang="ko-KR" altLang="en-US" dirty="0"/>
+                    </a:p>
+                  </a:txBody>
+                  <a:tcPr>
+                    <a:lnB w="12700" cap="flat" cmpd="sng" algn="ctr">
+                      <a:solidFill>
+                        <a:schemeClr val="bg1"/>
+                      </a:solidFill>
+                      <a:prstDash val="solid"/>
+                      <a:round/>
+                      <a:headEnd type="none" w="med" len="med"/>
+                      <a:tailEnd type="none" w="med" len="med"/>
+                    </a:lnB>
+                    <a:noFill/>
+                  </a:tcPr>
+                </a:tc>
+                <a:tc>
+                  <a:txBody>
+                    <a:bodyPr/>
+                    <a:lstStyle/>
+                    <a:p>
+                      <a:pPr latinLnBrk="1"/>
+                      <a:endParaRPr lang="ko-KR" altLang="en-US" dirty="0"/>
+                    </a:p>
+                  </a:txBody>
+                  <a:tcPr>
+                    <a:lnB w="12700" cap="flat" cmpd="sng" algn="ctr">
+                      <a:solidFill>
+                        <a:schemeClr val="bg1"/>
+                      </a:solidFill>
+                      <a:prstDash val="solid"/>
+                      <a:round/>
+                      <a:headEnd type="none" w="med" len="med"/>
+                      <a:tailEnd type="none" w="med" len="med"/>
+                    </a:lnB>
+                    <a:noFill/>
+                  </a:tcPr>
+                </a:tc>
+                <a:tc>
+                  <a:txBody>
+                    <a:bodyPr/>
+                    <a:lstStyle/>
+                    <a:p>
+                      <a:pPr latinLnBrk="1"/>
+                      <a:endParaRPr lang="ko-KR" altLang="en-US" dirty="0"/>
+                    </a:p>
+                  </a:txBody>
+                  <a:tcPr>
+                    <a:lnB w="12700" cap="flat" cmpd="sng" algn="ctr">
+                      <a:solidFill>
+                        <a:schemeClr val="bg1"/>
+                      </a:solidFill>
+                      <a:prstDash val="solid"/>
+                      <a:round/>
+                      <a:headEnd type="none" w="med" len="med"/>
+                      <a:tailEnd type="none" w="med" len="med"/>
+                    </a:lnB>
+                    <a:noFill/>
+                  </a:tcPr>
+                </a:tc>
+                <a:tc>
+                  <a:txBody>
+                    <a:bodyPr/>
+                    <a:lstStyle/>
+                    <a:p>
+                      <a:pPr latinLnBrk="1"/>
+                      <a:endParaRPr lang="ko-KR" altLang="en-US" dirty="0"/>
+                    </a:p>
+                  </a:txBody>
+                  <a:tcPr>
+                    <a:lnB w="12700" cap="flat" cmpd="sng" algn="ctr">
+                      <a:solidFill>
+                        <a:schemeClr val="bg1"/>
+                      </a:solidFill>
+                      <a:prstDash val="solid"/>
+                      <a:round/>
+                      <a:headEnd type="none" w="med" len="med"/>
+                      <a:tailEnd type="none" w="med" len="med"/>
+                    </a:lnB>
+                    <a:noFill/>
+                  </a:tcPr>
+                </a:tc>
+                <a:tc>
+                  <a:txBody>
+                    <a:bodyPr/>
+                    <a:lstStyle/>
+                    <a:p>
+                      <a:pPr latinLnBrk="1"/>
+                      <a:endParaRPr lang="ko-KR" altLang="en-US" dirty="0"/>
+                    </a:p>
+                  </a:txBody>
+                  <a:tcPr>
+                    <a:lnB w="12700" cap="flat" cmpd="sng" algn="ctr">
+                      <a:solidFill>
+                        <a:schemeClr val="bg1"/>
+                      </a:solidFill>
+                      <a:prstDash val="solid"/>
+                      <a:round/>
+                      <a:headEnd type="none" w="med" len="med"/>
+                      <a:tailEnd type="none" w="med" len="med"/>
+                    </a:lnB>
+                    <a:noFill/>
+                  </a:tcPr>
+                </a:tc>
+                <a:extLst>
+                  <a:ext uri="{0D108BD9-81ED-4DB2-BD59-A6C34878D82A}">
+                    <a16:rowId xmlns:a16="http://schemas.microsoft.com/office/drawing/2014/main" val="2732016016"/>
+                  </a:ext>
+                </a:extLst>
+              </a:tr>
+              <a:tr h="569708">
+                <a:tc>
+                  <a:txBody>
+                    <a:bodyPr/>
+                    <a:lstStyle/>
+                    <a:p>
+                      <a:pPr latinLnBrk="1"/>
+                      <a:endParaRPr lang="ko-KR" altLang="en-US" dirty="0"/>
+                    </a:p>
+                  </a:txBody>
+                  <a:tcPr>
+                    <a:lnT w="12700" cap="flat" cmpd="sng" algn="ctr">
+                      <a:solidFill>
+                        <a:schemeClr val="bg1"/>
+                      </a:solidFill>
+                      <a:prstDash val="solid"/>
+                      <a:round/>
+                      <a:headEnd type="none" w="med" len="med"/>
+                      <a:tailEnd type="none" w="med" len="med"/>
+                    </a:lnT>
+                    <a:noFill/>
+                  </a:tcPr>
+                </a:tc>
+                <a:tc>
+                  <a:txBody>
+                    <a:bodyPr/>
+                    <a:lstStyle/>
+                    <a:p>
+                      <a:pPr latinLnBrk="1"/>
+                      <a:endParaRPr lang="ko-KR" altLang="en-US" dirty="0"/>
+                    </a:p>
+                  </a:txBody>
+                  <a:tcPr>
+                    <a:lnT w="12700" cap="flat" cmpd="sng" algn="ctr">
+                      <a:solidFill>
+                        <a:schemeClr val="bg1"/>
+                      </a:solidFill>
+                      <a:prstDash val="solid"/>
+                      <a:round/>
+                      <a:headEnd type="none" w="med" len="med"/>
+                      <a:tailEnd type="none" w="med" len="med"/>
+                    </a:lnT>
+                    <a:noFill/>
+                  </a:tcPr>
+                </a:tc>
+                <a:tc>
+                  <a:txBody>
+                    <a:bodyPr/>
+                    <a:lstStyle/>
+                    <a:p>
+                      <a:pPr latinLnBrk="1"/>
+                      <a:endParaRPr lang="ko-KR" altLang="en-US" dirty="0"/>
+                    </a:p>
+                  </a:txBody>
+                  <a:tcPr>
+                    <a:lnT w="12700" cap="flat" cmpd="sng" algn="ctr">
+                      <a:solidFill>
+                        <a:schemeClr val="bg1"/>
+                      </a:solidFill>
+                      <a:prstDash val="solid"/>
+                      <a:round/>
+                      <a:headEnd type="none" w="med" len="med"/>
+                      <a:tailEnd type="none" w="med" len="med"/>
+                    </a:lnT>
+                    <a:noFill/>
+                  </a:tcPr>
+                </a:tc>
+                <a:tc>
+                  <a:txBody>
+                    <a:bodyPr/>
+                    <a:lstStyle/>
+                    <a:p>
+                      <a:pPr latinLnBrk="1"/>
+                      <a:endParaRPr lang="ko-KR" altLang="en-US" dirty="0"/>
+                    </a:p>
+                  </a:txBody>
+                  <a:tcPr>
+                    <a:lnT w="12700" cap="flat" cmpd="sng" algn="ctr">
+                      <a:solidFill>
+                        <a:schemeClr val="bg1"/>
+                      </a:solidFill>
+                      <a:prstDash val="solid"/>
+                      <a:round/>
+                      <a:headEnd type="none" w="med" len="med"/>
+                      <a:tailEnd type="none" w="med" len="med"/>
+                    </a:lnT>
+                    <a:noFill/>
+                  </a:tcPr>
+                </a:tc>
+                <a:tc>
+                  <a:txBody>
+                    <a:bodyPr/>
+                    <a:lstStyle/>
+                    <a:p>
+                      <a:pPr latinLnBrk="1"/>
+                      <a:endParaRPr lang="ko-KR" altLang="en-US" dirty="0"/>
+                    </a:p>
+                  </a:txBody>
+                  <a:tcPr>
+                    <a:lnT w="12700" cap="flat" cmpd="sng" algn="ctr">
+                      <a:solidFill>
+                        <a:schemeClr val="bg1"/>
+                      </a:solidFill>
+                      <a:prstDash val="solid"/>
+                      <a:round/>
+                      <a:headEnd type="none" w="med" len="med"/>
+                      <a:tailEnd type="none" w="med" len="med"/>
+                    </a:lnT>
+                    <a:noFill/>
+                  </a:tcPr>
+                </a:tc>
+                <a:extLst>
+                  <a:ext uri="{0D108BD9-81ED-4DB2-BD59-A6C34878D82A}">
+                    <a16:rowId xmlns:a16="http://schemas.microsoft.com/office/drawing/2014/main" val="2769820276"/>
+                  </a:ext>
+                </a:extLst>
+              </a:tr>
+              <a:tr h="569708">
+                <a:tc>
+                  <a:txBody>
+                    <a:bodyPr/>
+                    <a:lstStyle/>
+                    <a:p>
+                      <a:pPr latinLnBrk="1"/>
+                      <a:endParaRPr lang="ko-KR" altLang="en-US" dirty="0"/>
+                    </a:p>
+                  </a:txBody>
+                  <a:tcPr>
+                    <a:noFill/>
+                  </a:tcPr>
+                </a:tc>
+                <a:tc>
+                  <a:txBody>
+                    <a:bodyPr/>
+                    <a:lstStyle/>
+                    <a:p>
+                      <a:pPr latinLnBrk="1"/>
+                      <a:endParaRPr lang="ko-KR" altLang="en-US" dirty="0"/>
+                    </a:p>
+                  </a:txBody>
+                  <a:tcPr>
+                    <a:noFill/>
+                  </a:tcPr>
+                </a:tc>
+                <a:tc>
+                  <a:txBody>
+                    <a:bodyPr/>
+                    <a:lstStyle/>
+                    <a:p>
+                      <a:pPr latinLnBrk="1"/>
+                      <a:endParaRPr lang="ko-KR" altLang="en-US" dirty="0"/>
+                    </a:p>
+                  </a:txBody>
+                  <a:tcPr>
+                    <a:noFill/>
+                  </a:tcPr>
+                </a:tc>
+                <a:tc>
+                  <a:txBody>
+                    <a:bodyPr/>
+                    <a:lstStyle/>
+                    <a:p>
+                      <a:pPr latinLnBrk="1"/>
+                      <a:endParaRPr lang="ko-KR" altLang="en-US" dirty="0"/>
+                    </a:p>
+                  </a:txBody>
+                  <a:tcPr>
+                    <a:noFill/>
+                  </a:tcPr>
+                </a:tc>
+                <a:tc>
+                  <a:txBody>
+                    <a:bodyPr/>
+                    <a:lstStyle/>
+                    <a:p>
+                      <a:pPr latinLnBrk="1"/>
+                      <a:endParaRPr lang="ko-KR" altLang="en-US" dirty="0"/>
+                    </a:p>
+                  </a:txBody>
+                  <a:tcPr>
+                    <a:noFill/>
+                  </a:tcPr>
+                </a:tc>
+                <a:extLst>
+                  <a:ext uri="{0D108BD9-81ED-4DB2-BD59-A6C34878D82A}">
+                    <a16:rowId xmlns:a16="http://schemas.microsoft.com/office/drawing/2014/main" val="1800615351"/>
+                  </a:ext>
+                </a:extLst>
+              </a:tr>
+              <a:tr h="569708">
+                <a:tc>
+                  <a:txBody>
+                    <a:bodyPr/>
+                    <a:lstStyle/>
+                    <a:p>
+                      <a:pPr latinLnBrk="1"/>
+                      <a:endParaRPr lang="ko-KR" altLang="en-US" dirty="0"/>
+                    </a:p>
+                  </a:txBody>
+                  <a:tcPr>
+                    <a:noFill/>
+                  </a:tcPr>
+                </a:tc>
+                <a:tc>
+                  <a:txBody>
+                    <a:bodyPr/>
+                    <a:lstStyle/>
+                    <a:p>
+                      <a:pPr latinLnBrk="1"/>
+                      <a:endParaRPr lang="ko-KR" altLang="en-US"/>
+                    </a:p>
+                  </a:txBody>
+                  <a:tcPr>
+                    <a:noFill/>
+                  </a:tcPr>
+                </a:tc>
+                <a:tc>
+                  <a:txBody>
+                    <a:bodyPr/>
+                    <a:lstStyle/>
+                    <a:p>
+                      <a:pPr latinLnBrk="1"/>
+                      <a:endParaRPr lang="ko-KR" altLang="en-US"/>
+                    </a:p>
+                  </a:txBody>
+                  <a:tcPr>
+                    <a:noFill/>
+                  </a:tcPr>
+                </a:tc>
+                <a:tc>
+                  <a:txBody>
+                    <a:bodyPr/>
+                    <a:lstStyle/>
+                    <a:p>
+                      <a:pPr latinLnBrk="1"/>
+                      <a:endParaRPr lang="ko-KR" altLang="en-US" dirty="0"/>
+                    </a:p>
+                  </a:txBody>
+                  <a:tcPr>
+                    <a:noFill/>
+                  </a:tcPr>
+                </a:tc>
+                <a:tc>
+                  <a:txBody>
+                    <a:bodyPr/>
+                    <a:lstStyle/>
+                    <a:p>
+                      <a:pPr latinLnBrk="1"/>
+                      <a:endParaRPr lang="ko-KR" altLang="en-US" dirty="0"/>
+                    </a:p>
+                  </a:txBody>
+                  <a:tcPr>
+                    <a:noFill/>
+                  </a:tcPr>
+                </a:tc>
+                <a:extLst>
+                  <a:ext uri="{0D108BD9-81ED-4DB2-BD59-A6C34878D82A}">
+                    <a16:rowId xmlns:a16="http://schemas.microsoft.com/office/drawing/2014/main" val="3198244239"/>
+                  </a:ext>
+                </a:extLst>
+              </a:tr>
+              <a:tr h="569708">
+                <a:tc>
+                  <a:txBody>
+                    <a:bodyPr/>
+                    <a:lstStyle/>
+                    <a:p>
+                      <a:pPr latinLnBrk="1"/>
+                      <a:endParaRPr lang="ko-KR" altLang="en-US" dirty="0"/>
+                    </a:p>
+                  </a:txBody>
+                  <a:tcPr>
+                    <a:noFill/>
+                  </a:tcPr>
+                </a:tc>
+                <a:tc>
+                  <a:txBody>
+                    <a:bodyPr/>
+                    <a:lstStyle/>
+                    <a:p>
+                      <a:pPr latinLnBrk="1"/>
+                      <a:endParaRPr lang="ko-KR" altLang="en-US"/>
+                    </a:p>
+                  </a:txBody>
+                  <a:tcPr>
+                    <a:noFill/>
+                  </a:tcPr>
+                </a:tc>
+                <a:tc>
+                  <a:txBody>
+                    <a:bodyPr/>
+                    <a:lstStyle/>
+                    <a:p>
+                      <a:pPr latinLnBrk="1"/>
+                      <a:endParaRPr lang="ko-KR" altLang="en-US" dirty="0"/>
+                    </a:p>
+                  </a:txBody>
+                  <a:tcPr>
+                    <a:noFill/>
+                  </a:tcPr>
+                </a:tc>
+                <a:tc>
+                  <a:txBody>
+                    <a:bodyPr/>
+                    <a:lstStyle/>
+                    <a:p>
+                      <a:pPr latinLnBrk="1"/>
+                      <a:endParaRPr lang="ko-KR" altLang="en-US" dirty="0"/>
+                    </a:p>
+                  </a:txBody>
+                  <a:tcPr>
+                    <a:noFill/>
+                  </a:tcPr>
+                </a:tc>
+                <a:tc>
+                  <a:txBody>
+                    <a:bodyPr/>
+                    <a:lstStyle/>
+                    <a:p>
+                      <a:pPr latinLnBrk="1"/>
+                      <a:endParaRPr lang="ko-KR" altLang="en-US" dirty="0"/>
+                    </a:p>
+                  </a:txBody>
+                  <a:tcPr>
+                    <a:noFill/>
+                  </a:tcPr>
+                </a:tc>
+                <a:extLst>
+                  <a:ext uri="{0D108BD9-81ED-4DB2-BD59-A6C34878D82A}">
+                    <a16:rowId xmlns:a16="http://schemas.microsoft.com/office/drawing/2014/main" val="4208654686"/>
+                  </a:ext>
+                </a:extLst>
+              </a:tr>
+            </a:tbl>
+          </a:graphicData>
+        </a:graphic>
+      </p:graphicFrame>
     </p:spTree>
     <p:extLst>
       <p:ext uri="{BB962C8B-B14F-4D97-AF65-F5344CB8AC3E}">

</xml_diff>